<commit_message>
Default species list now updates seq counts
</commit_message>
<xml_diff>
--- a/User_Guide_UniProt.pptx
+++ b/User_Guide_UniProt.pptx
@@ -124,10 +124,6 @@
 </p:presentation>
 </file>
 
-<file path=ppt/revisionInfo.xml><?xml version="1.0" encoding="utf-8"?>
-<p1510:revInfo xmlns:a="http://schemas.openxmlformats.org/drawingml/2006/main" xmlns:r="http://schemas.openxmlformats.org/officeDocument/2006/relationships" xmlns:p1510="http://schemas.microsoft.com/office/powerpoint/2015/10/main"/>
-</file>
-
 <file path=ppt/slideLayouts/slideLayout1.xml><?xml version="1.0" encoding="utf-8"?>
 <p:sldLayout xmlns:a="http://schemas.openxmlformats.org/drawingml/2006/main" xmlns:r="http://schemas.openxmlformats.org/officeDocument/2006/relationships" xmlns:p="http://schemas.openxmlformats.org/presentationml/2006/main" type="title" preserve="1">
   <p:cSld name="Title Slide">
@@ -150,7 +146,7 @@
           <p:cNvPr id="2" name="Title 1">
             <a:extLst>
               <a:ext uri="{FF2B5EF4-FFF2-40B4-BE49-F238E27FC236}">
-                <a16:creationId xmlns:a16="http://schemas.microsoft.com/office/drawing/2014/main" xmlns="" id="{1CEC9522-93E9-44EF-812C-19BBE36871AB}"/>
+                <a16:creationId xmlns:a16="http://schemas.microsoft.com/office/drawing/2014/main" id="{1CEC9522-93E9-44EF-812C-19BBE36871AB}"/>
               </a:ext>
             </a:extLst>
           </p:cNvPr>
@@ -187,7 +183,7 @@
           <p:cNvPr id="3" name="Subtitle 2">
             <a:extLst>
               <a:ext uri="{FF2B5EF4-FFF2-40B4-BE49-F238E27FC236}">
-                <a16:creationId xmlns:a16="http://schemas.microsoft.com/office/drawing/2014/main" xmlns="" id="{B1019D7F-359A-46C8-AA57-22165142DC8D}"/>
+                <a16:creationId xmlns:a16="http://schemas.microsoft.com/office/drawing/2014/main" id="{B1019D7F-359A-46C8-AA57-22165142DC8D}"/>
               </a:ext>
             </a:extLst>
           </p:cNvPr>
@@ -257,7 +253,7 @@
           <p:cNvPr id="4" name="Date Placeholder 3">
             <a:extLst>
               <a:ext uri="{FF2B5EF4-FFF2-40B4-BE49-F238E27FC236}">
-                <a16:creationId xmlns:a16="http://schemas.microsoft.com/office/drawing/2014/main" xmlns="" id="{ED2F6D59-659B-40D8-9B5D-F5EA69350F2E}"/>
+                <a16:creationId xmlns:a16="http://schemas.microsoft.com/office/drawing/2014/main" id="{ED2F6D59-659B-40D8-9B5D-F5EA69350F2E}"/>
               </a:ext>
             </a:extLst>
           </p:cNvPr>
@@ -275,7 +271,7 @@
           <a:p>
             <a:fld id="{451BDFE6-D27D-4DA7-953E-74377D1BCDB7}" type="datetimeFigureOut">
               <a:rPr lang="en-US" smtClean="0"/>
-              <a:t>8/13/17</a:t>
+              <a:t>8/9/18</a:t>
             </a:fld>
             <a:endParaRPr lang="en-US"/>
           </a:p>
@@ -286,7 +282,7 @@
           <p:cNvPr id="5" name="Footer Placeholder 4">
             <a:extLst>
               <a:ext uri="{FF2B5EF4-FFF2-40B4-BE49-F238E27FC236}">
-                <a16:creationId xmlns:a16="http://schemas.microsoft.com/office/drawing/2014/main" xmlns="" id="{AAAB214F-8D5F-4F99-BDA0-03F3BE3612E9}"/>
+                <a16:creationId xmlns:a16="http://schemas.microsoft.com/office/drawing/2014/main" id="{AAAB214F-8D5F-4F99-BDA0-03F3BE3612E9}"/>
               </a:ext>
             </a:extLst>
           </p:cNvPr>
@@ -311,7 +307,7 @@
           <p:cNvPr id="6" name="Slide Number Placeholder 5">
             <a:extLst>
               <a:ext uri="{FF2B5EF4-FFF2-40B4-BE49-F238E27FC236}">
-                <a16:creationId xmlns:a16="http://schemas.microsoft.com/office/drawing/2014/main" xmlns="" id="{C18AB0CB-92D4-4AC1-8248-D82CA20B25B3}"/>
+                <a16:creationId xmlns:a16="http://schemas.microsoft.com/office/drawing/2014/main" id="{C18AB0CB-92D4-4AC1-8248-D82CA20B25B3}"/>
               </a:ext>
             </a:extLst>
           </p:cNvPr>
@@ -370,7 +366,7 @@
           <p:cNvPr id="2" name="Title 1">
             <a:extLst>
               <a:ext uri="{FF2B5EF4-FFF2-40B4-BE49-F238E27FC236}">
-                <a16:creationId xmlns:a16="http://schemas.microsoft.com/office/drawing/2014/main" xmlns="" id="{99695FEF-F41E-4535-8546-1EFDA5EDD6DE}"/>
+                <a16:creationId xmlns:a16="http://schemas.microsoft.com/office/drawing/2014/main" id="{99695FEF-F41E-4535-8546-1EFDA5EDD6DE}"/>
               </a:ext>
             </a:extLst>
           </p:cNvPr>
@@ -398,7 +394,7 @@
           <p:cNvPr id="3" name="Vertical Text Placeholder 2">
             <a:extLst>
               <a:ext uri="{FF2B5EF4-FFF2-40B4-BE49-F238E27FC236}">
-                <a16:creationId xmlns:a16="http://schemas.microsoft.com/office/drawing/2014/main" xmlns="" id="{70606A92-B9AD-4004-BFBE-B21891BE4323}"/>
+                <a16:creationId xmlns:a16="http://schemas.microsoft.com/office/drawing/2014/main" id="{70606A92-B9AD-4004-BFBE-B21891BE4323}"/>
               </a:ext>
             </a:extLst>
           </p:cNvPr>
@@ -455,7 +451,7 @@
           <p:cNvPr id="4" name="Date Placeholder 3">
             <a:extLst>
               <a:ext uri="{FF2B5EF4-FFF2-40B4-BE49-F238E27FC236}">
-                <a16:creationId xmlns:a16="http://schemas.microsoft.com/office/drawing/2014/main" xmlns="" id="{C15B744A-4AD6-4603-8D91-95814ADD1C8A}"/>
+                <a16:creationId xmlns:a16="http://schemas.microsoft.com/office/drawing/2014/main" id="{C15B744A-4AD6-4603-8D91-95814ADD1C8A}"/>
               </a:ext>
             </a:extLst>
           </p:cNvPr>
@@ -473,7 +469,7 @@
           <a:p>
             <a:fld id="{451BDFE6-D27D-4DA7-953E-74377D1BCDB7}" type="datetimeFigureOut">
               <a:rPr lang="en-US" smtClean="0"/>
-              <a:t>8/13/17</a:t>
+              <a:t>8/9/18</a:t>
             </a:fld>
             <a:endParaRPr lang="en-US"/>
           </a:p>
@@ -484,7 +480,7 @@
           <p:cNvPr id="5" name="Footer Placeholder 4">
             <a:extLst>
               <a:ext uri="{FF2B5EF4-FFF2-40B4-BE49-F238E27FC236}">
-                <a16:creationId xmlns:a16="http://schemas.microsoft.com/office/drawing/2014/main" xmlns="" id="{A8369442-DDC6-47BB-A8A6-F3A8C8F9BFC2}"/>
+                <a16:creationId xmlns:a16="http://schemas.microsoft.com/office/drawing/2014/main" id="{A8369442-DDC6-47BB-A8A6-F3A8C8F9BFC2}"/>
               </a:ext>
             </a:extLst>
           </p:cNvPr>
@@ -509,7 +505,7 @@
           <p:cNvPr id="6" name="Slide Number Placeholder 5">
             <a:extLst>
               <a:ext uri="{FF2B5EF4-FFF2-40B4-BE49-F238E27FC236}">
-                <a16:creationId xmlns:a16="http://schemas.microsoft.com/office/drawing/2014/main" xmlns="" id="{43DD66A6-AEE4-48D1-92D8-C28956EE6A69}"/>
+                <a16:creationId xmlns:a16="http://schemas.microsoft.com/office/drawing/2014/main" id="{43DD66A6-AEE4-48D1-92D8-C28956EE6A69}"/>
               </a:ext>
             </a:extLst>
           </p:cNvPr>
@@ -568,7 +564,7 @@
           <p:cNvPr id="2" name="Vertical Title 1">
             <a:extLst>
               <a:ext uri="{FF2B5EF4-FFF2-40B4-BE49-F238E27FC236}">
-                <a16:creationId xmlns:a16="http://schemas.microsoft.com/office/drawing/2014/main" xmlns="" id="{2AC2B49F-2767-487A-8057-45DDB33A32B8}"/>
+                <a16:creationId xmlns:a16="http://schemas.microsoft.com/office/drawing/2014/main" id="{2AC2B49F-2767-487A-8057-45DDB33A32B8}"/>
               </a:ext>
             </a:extLst>
           </p:cNvPr>
@@ -601,7 +597,7 @@
           <p:cNvPr id="3" name="Vertical Text Placeholder 2">
             <a:extLst>
               <a:ext uri="{FF2B5EF4-FFF2-40B4-BE49-F238E27FC236}">
-                <a16:creationId xmlns:a16="http://schemas.microsoft.com/office/drawing/2014/main" xmlns="" id="{322FEB0F-C822-4E90-B43B-739BA145CB5E}"/>
+                <a16:creationId xmlns:a16="http://schemas.microsoft.com/office/drawing/2014/main" id="{322FEB0F-C822-4E90-B43B-739BA145CB5E}"/>
               </a:ext>
             </a:extLst>
           </p:cNvPr>
@@ -663,7 +659,7 @@
           <p:cNvPr id="4" name="Date Placeholder 3">
             <a:extLst>
               <a:ext uri="{FF2B5EF4-FFF2-40B4-BE49-F238E27FC236}">
-                <a16:creationId xmlns:a16="http://schemas.microsoft.com/office/drawing/2014/main" xmlns="" id="{F875980F-FE1D-4FD7-BFA9-AC910F6E9AB4}"/>
+                <a16:creationId xmlns:a16="http://schemas.microsoft.com/office/drawing/2014/main" id="{F875980F-FE1D-4FD7-BFA9-AC910F6E9AB4}"/>
               </a:ext>
             </a:extLst>
           </p:cNvPr>
@@ -681,7 +677,7 @@
           <a:p>
             <a:fld id="{451BDFE6-D27D-4DA7-953E-74377D1BCDB7}" type="datetimeFigureOut">
               <a:rPr lang="en-US" smtClean="0"/>
-              <a:t>8/13/17</a:t>
+              <a:t>8/9/18</a:t>
             </a:fld>
             <a:endParaRPr lang="en-US"/>
           </a:p>
@@ -692,7 +688,7 @@
           <p:cNvPr id="5" name="Footer Placeholder 4">
             <a:extLst>
               <a:ext uri="{FF2B5EF4-FFF2-40B4-BE49-F238E27FC236}">
-                <a16:creationId xmlns:a16="http://schemas.microsoft.com/office/drawing/2014/main" xmlns="" id="{861D4100-774F-40D2-A03D-5F8C7952FD47}"/>
+                <a16:creationId xmlns:a16="http://schemas.microsoft.com/office/drawing/2014/main" id="{861D4100-774F-40D2-A03D-5F8C7952FD47}"/>
               </a:ext>
             </a:extLst>
           </p:cNvPr>
@@ -717,7 +713,7 @@
           <p:cNvPr id="6" name="Slide Number Placeholder 5">
             <a:extLst>
               <a:ext uri="{FF2B5EF4-FFF2-40B4-BE49-F238E27FC236}">
-                <a16:creationId xmlns:a16="http://schemas.microsoft.com/office/drawing/2014/main" xmlns="" id="{D6219F0B-C0E7-4C63-BD7E-B5808CFAD062}"/>
+                <a16:creationId xmlns:a16="http://schemas.microsoft.com/office/drawing/2014/main" id="{D6219F0B-C0E7-4C63-BD7E-B5808CFAD062}"/>
               </a:ext>
             </a:extLst>
           </p:cNvPr>
@@ -776,7 +772,7 @@
           <p:cNvPr id="2" name="Title 1">
             <a:extLst>
               <a:ext uri="{FF2B5EF4-FFF2-40B4-BE49-F238E27FC236}">
-                <a16:creationId xmlns:a16="http://schemas.microsoft.com/office/drawing/2014/main" xmlns="" id="{E1710EEA-FBE7-42D5-8A9D-2D337EA09C52}"/>
+                <a16:creationId xmlns:a16="http://schemas.microsoft.com/office/drawing/2014/main" id="{E1710EEA-FBE7-42D5-8A9D-2D337EA09C52}"/>
               </a:ext>
             </a:extLst>
           </p:cNvPr>
@@ -804,7 +800,7 @@
           <p:cNvPr id="3" name="Content Placeholder 2">
             <a:extLst>
               <a:ext uri="{FF2B5EF4-FFF2-40B4-BE49-F238E27FC236}">
-                <a16:creationId xmlns:a16="http://schemas.microsoft.com/office/drawing/2014/main" xmlns="" id="{133641DF-E82A-45B8-9D52-B194C8074720}"/>
+                <a16:creationId xmlns:a16="http://schemas.microsoft.com/office/drawing/2014/main" id="{133641DF-E82A-45B8-9D52-B194C8074720}"/>
               </a:ext>
             </a:extLst>
           </p:cNvPr>
@@ -861,7 +857,7 @@
           <p:cNvPr id="4" name="Date Placeholder 3">
             <a:extLst>
               <a:ext uri="{FF2B5EF4-FFF2-40B4-BE49-F238E27FC236}">
-                <a16:creationId xmlns:a16="http://schemas.microsoft.com/office/drawing/2014/main" xmlns="" id="{2F50B840-B826-4A5A-A600-3F68F1C3CCC5}"/>
+                <a16:creationId xmlns:a16="http://schemas.microsoft.com/office/drawing/2014/main" id="{2F50B840-B826-4A5A-A600-3F68F1C3CCC5}"/>
               </a:ext>
             </a:extLst>
           </p:cNvPr>
@@ -879,7 +875,7 @@
           <a:p>
             <a:fld id="{451BDFE6-D27D-4DA7-953E-74377D1BCDB7}" type="datetimeFigureOut">
               <a:rPr lang="en-US" smtClean="0"/>
-              <a:t>8/13/17</a:t>
+              <a:t>8/9/18</a:t>
             </a:fld>
             <a:endParaRPr lang="en-US"/>
           </a:p>
@@ -890,7 +886,7 @@
           <p:cNvPr id="5" name="Footer Placeholder 4">
             <a:extLst>
               <a:ext uri="{FF2B5EF4-FFF2-40B4-BE49-F238E27FC236}">
-                <a16:creationId xmlns:a16="http://schemas.microsoft.com/office/drawing/2014/main" xmlns="" id="{C2A15F6D-F3C8-4075-BEA6-BB0D5E7516B4}"/>
+                <a16:creationId xmlns:a16="http://schemas.microsoft.com/office/drawing/2014/main" id="{C2A15F6D-F3C8-4075-BEA6-BB0D5E7516B4}"/>
               </a:ext>
             </a:extLst>
           </p:cNvPr>
@@ -915,7 +911,7 @@
           <p:cNvPr id="6" name="Slide Number Placeholder 5">
             <a:extLst>
               <a:ext uri="{FF2B5EF4-FFF2-40B4-BE49-F238E27FC236}">
-                <a16:creationId xmlns:a16="http://schemas.microsoft.com/office/drawing/2014/main" xmlns="" id="{1345D41C-A83F-4006-9364-239DFC09EF0F}"/>
+                <a16:creationId xmlns:a16="http://schemas.microsoft.com/office/drawing/2014/main" id="{1345D41C-A83F-4006-9364-239DFC09EF0F}"/>
               </a:ext>
             </a:extLst>
           </p:cNvPr>
@@ -974,7 +970,7 @@
           <p:cNvPr id="2" name="Title 1">
             <a:extLst>
               <a:ext uri="{FF2B5EF4-FFF2-40B4-BE49-F238E27FC236}">
-                <a16:creationId xmlns:a16="http://schemas.microsoft.com/office/drawing/2014/main" xmlns="" id="{85C41ECE-2DDF-4E64-9356-6A089082ACD0}"/>
+                <a16:creationId xmlns:a16="http://schemas.microsoft.com/office/drawing/2014/main" id="{85C41ECE-2DDF-4E64-9356-6A089082ACD0}"/>
               </a:ext>
             </a:extLst>
           </p:cNvPr>
@@ -1011,7 +1007,7 @@
           <p:cNvPr id="3" name="Text Placeholder 2">
             <a:extLst>
               <a:ext uri="{FF2B5EF4-FFF2-40B4-BE49-F238E27FC236}">
-                <a16:creationId xmlns:a16="http://schemas.microsoft.com/office/drawing/2014/main" xmlns="" id="{99BB1483-3FE2-4F8E-B793-89FBDECD3910}"/>
+                <a16:creationId xmlns:a16="http://schemas.microsoft.com/office/drawing/2014/main" id="{99BB1483-3FE2-4F8E-B793-89FBDECD3910}"/>
               </a:ext>
             </a:extLst>
           </p:cNvPr>
@@ -1136,7 +1132,7 @@
           <p:cNvPr id="4" name="Date Placeholder 3">
             <a:extLst>
               <a:ext uri="{FF2B5EF4-FFF2-40B4-BE49-F238E27FC236}">
-                <a16:creationId xmlns:a16="http://schemas.microsoft.com/office/drawing/2014/main" xmlns="" id="{B2803368-05EC-4347-91AB-E1848E86CDDA}"/>
+                <a16:creationId xmlns:a16="http://schemas.microsoft.com/office/drawing/2014/main" id="{B2803368-05EC-4347-91AB-E1848E86CDDA}"/>
               </a:ext>
             </a:extLst>
           </p:cNvPr>
@@ -1154,7 +1150,7 @@
           <a:p>
             <a:fld id="{451BDFE6-D27D-4DA7-953E-74377D1BCDB7}" type="datetimeFigureOut">
               <a:rPr lang="en-US" smtClean="0"/>
-              <a:t>8/13/17</a:t>
+              <a:t>8/9/18</a:t>
             </a:fld>
             <a:endParaRPr lang="en-US"/>
           </a:p>
@@ -1165,7 +1161,7 @@
           <p:cNvPr id="5" name="Footer Placeholder 4">
             <a:extLst>
               <a:ext uri="{FF2B5EF4-FFF2-40B4-BE49-F238E27FC236}">
-                <a16:creationId xmlns:a16="http://schemas.microsoft.com/office/drawing/2014/main" xmlns="" id="{0A8D4987-E617-4881-8391-D9226A3040C6}"/>
+                <a16:creationId xmlns:a16="http://schemas.microsoft.com/office/drawing/2014/main" id="{0A8D4987-E617-4881-8391-D9226A3040C6}"/>
               </a:ext>
             </a:extLst>
           </p:cNvPr>
@@ -1190,7 +1186,7 @@
           <p:cNvPr id="6" name="Slide Number Placeholder 5">
             <a:extLst>
               <a:ext uri="{FF2B5EF4-FFF2-40B4-BE49-F238E27FC236}">
-                <a16:creationId xmlns:a16="http://schemas.microsoft.com/office/drawing/2014/main" xmlns="" id="{96B6BB51-0A87-45A5-862A-0F78722361A1}"/>
+                <a16:creationId xmlns:a16="http://schemas.microsoft.com/office/drawing/2014/main" id="{96B6BB51-0A87-45A5-862A-0F78722361A1}"/>
               </a:ext>
             </a:extLst>
           </p:cNvPr>
@@ -1249,7 +1245,7 @@
           <p:cNvPr id="2" name="Title 1">
             <a:extLst>
               <a:ext uri="{FF2B5EF4-FFF2-40B4-BE49-F238E27FC236}">
-                <a16:creationId xmlns:a16="http://schemas.microsoft.com/office/drawing/2014/main" xmlns="" id="{F440525D-EBDD-464C-AE08-797DE00DAAA0}"/>
+                <a16:creationId xmlns:a16="http://schemas.microsoft.com/office/drawing/2014/main" id="{F440525D-EBDD-464C-AE08-797DE00DAAA0}"/>
               </a:ext>
             </a:extLst>
           </p:cNvPr>
@@ -1277,7 +1273,7 @@
           <p:cNvPr id="3" name="Content Placeholder 2">
             <a:extLst>
               <a:ext uri="{FF2B5EF4-FFF2-40B4-BE49-F238E27FC236}">
-                <a16:creationId xmlns:a16="http://schemas.microsoft.com/office/drawing/2014/main" xmlns="" id="{BC586405-A41B-4F12-B054-B9E618F25ED6}"/>
+                <a16:creationId xmlns:a16="http://schemas.microsoft.com/office/drawing/2014/main" id="{BC586405-A41B-4F12-B054-B9E618F25ED6}"/>
               </a:ext>
             </a:extLst>
           </p:cNvPr>
@@ -1339,7 +1335,7 @@
           <p:cNvPr id="4" name="Content Placeholder 3">
             <a:extLst>
               <a:ext uri="{FF2B5EF4-FFF2-40B4-BE49-F238E27FC236}">
-                <a16:creationId xmlns:a16="http://schemas.microsoft.com/office/drawing/2014/main" xmlns="" id="{AE69ED25-6001-4519-99AE-B19883DE36E8}"/>
+                <a16:creationId xmlns:a16="http://schemas.microsoft.com/office/drawing/2014/main" id="{AE69ED25-6001-4519-99AE-B19883DE36E8}"/>
               </a:ext>
             </a:extLst>
           </p:cNvPr>
@@ -1401,7 +1397,7 @@
           <p:cNvPr id="5" name="Date Placeholder 4">
             <a:extLst>
               <a:ext uri="{FF2B5EF4-FFF2-40B4-BE49-F238E27FC236}">
-                <a16:creationId xmlns:a16="http://schemas.microsoft.com/office/drawing/2014/main" xmlns="" id="{A398D7DF-D37F-4943-A3DC-C39014B86553}"/>
+                <a16:creationId xmlns:a16="http://schemas.microsoft.com/office/drawing/2014/main" id="{A398D7DF-D37F-4943-A3DC-C39014B86553}"/>
               </a:ext>
             </a:extLst>
           </p:cNvPr>
@@ -1419,7 +1415,7 @@
           <a:p>
             <a:fld id="{451BDFE6-D27D-4DA7-953E-74377D1BCDB7}" type="datetimeFigureOut">
               <a:rPr lang="en-US" smtClean="0"/>
-              <a:t>8/13/17</a:t>
+              <a:t>8/9/18</a:t>
             </a:fld>
             <a:endParaRPr lang="en-US"/>
           </a:p>
@@ -1430,7 +1426,7 @@
           <p:cNvPr id="6" name="Footer Placeholder 5">
             <a:extLst>
               <a:ext uri="{FF2B5EF4-FFF2-40B4-BE49-F238E27FC236}">
-                <a16:creationId xmlns:a16="http://schemas.microsoft.com/office/drawing/2014/main" xmlns="" id="{F3CB2BC9-A6BA-45E0-B9C5-0B6FC47560DC}"/>
+                <a16:creationId xmlns:a16="http://schemas.microsoft.com/office/drawing/2014/main" id="{F3CB2BC9-A6BA-45E0-B9C5-0B6FC47560DC}"/>
               </a:ext>
             </a:extLst>
           </p:cNvPr>
@@ -1455,7 +1451,7 @@
           <p:cNvPr id="7" name="Slide Number Placeholder 6">
             <a:extLst>
               <a:ext uri="{FF2B5EF4-FFF2-40B4-BE49-F238E27FC236}">
-                <a16:creationId xmlns:a16="http://schemas.microsoft.com/office/drawing/2014/main" xmlns="" id="{D98CC828-E334-4D72-BE5E-3C6620A6F804}"/>
+                <a16:creationId xmlns:a16="http://schemas.microsoft.com/office/drawing/2014/main" id="{D98CC828-E334-4D72-BE5E-3C6620A6F804}"/>
               </a:ext>
             </a:extLst>
           </p:cNvPr>
@@ -1514,7 +1510,7 @@
           <p:cNvPr id="2" name="Title 1">
             <a:extLst>
               <a:ext uri="{FF2B5EF4-FFF2-40B4-BE49-F238E27FC236}">
-                <a16:creationId xmlns:a16="http://schemas.microsoft.com/office/drawing/2014/main" xmlns="" id="{1A2BC910-7622-4C43-B7D8-7F31E9512B8E}"/>
+                <a16:creationId xmlns:a16="http://schemas.microsoft.com/office/drawing/2014/main" id="{1A2BC910-7622-4C43-B7D8-7F31E9512B8E}"/>
               </a:ext>
             </a:extLst>
           </p:cNvPr>
@@ -1547,7 +1543,7 @@
           <p:cNvPr id="3" name="Text Placeholder 2">
             <a:extLst>
               <a:ext uri="{FF2B5EF4-FFF2-40B4-BE49-F238E27FC236}">
-                <a16:creationId xmlns:a16="http://schemas.microsoft.com/office/drawing/2014/main" xmlns="" id="{85551A84-BFDE-4863-899B-AC470B7E100F}"/>
+                <a16:creationId xmlns:a16="http://schemas.microsoft.com/office/drawing/2014/main" id="{85551A84-BFDE-4863-899B-AC470B7E100F}"/>
               </a:ext>
             </a:extLst>
           </p:cNvPr>
@@ -1618,7 +1614,7 @@
           <p:cNvPr id="4" name="Content Placeholder 3">
             <a:extLst>
               <a:ext uri="{FF2B5EF4-FFF2-40B4-BE49-F238E27FC236}">
-                <a16:creationId xmlns:a16="http://schemas.microsoft.com/office/drawing/2014/main" xmlns="" id="{B7E0CD55-F1F5-4DD2-BE6D-857F1B3AD118}"/>
+                <a16:creationId xmlns:a16="http://schemas.microsoft.com/office/drawing/2014/main" id="{B7E0CD55-F1F5-4DD2-BE6D-857F1B3AD118}"/>
               </a:ext>
             </a:extLst>
           </p:cNvPr>
@@ -1680,7 +1676,7 @@
           <p:cNvPr id="5" name="Text Placeholder 4">
             <a:extLst>
               <a:ext uri="{FF2B5EF4-FFF2-40B4-BE49-F238E27FC236}">
-                <a16:creationId xmlns:a16="http://schemas.microsoft.com/office/drawing/2014/main" xmlns="" id="{A3522D88-33B2-4601-B02A-3DEBD7321508}"/>
+                <a16:creationId xmlns:a16="http://schemas.microsoft.com/office/drawing/2014/main" id="{A3522D88-33B2-4601-B02A-3DEBD7321508}"/>
               </a:ext>
             </a:extLst>
           </p:cNvPr>
@@ -1751,7 +1747,7 @@
           <p:cNvPr id="6" name="Content Placeholder 5">
             <a:extLst>
               <a:ext uri="{FF2B5EF4-FFF2-40B4-BE49-F238E27FC236}">
-                <a16:creationId xmlns:a16="http://schemas.microsoft.com/office/drawing/2014/main" xmlns="" id="{176A6E08-7D30-46B1-8CC8-DAC6E058AB42}"/>
+                <a16:creationId xmlns:a16="http://schemas.microsoft.com/office/drawing/2014/main" id="{176A6E08-7D30-46B1-8CC8-DAC6E058AB42}"/>
               </a:ext>
             </a:extLst>
           </p:cNvPr>
@@ -1813,7 +1809,7 @@
           <p:cNvPr id="7" name="Date Placeholder 6">
             <a:extLst>
               <a:ext uri="{FF2B5EF4-FFF2-40B4-BE49-F238E27FC236}">
-                <a16:creationId xmlns:a16="http://schemas.microsoft.com/office/drawing/2014/main" xmlns="" id="{12C07FFB-384F-4120-9F74-2493FFF5045B}"/>
+                <a16:creationId xmlns:a16="http://schemas.microsoft.com/office/drawing/2014/main" id="{12C07FFB-384F-4120-9F74-2493FFF5045B}"/>
               </a:ext>
             </a:extLst>
           </p:cNvPr>
@@ -1831,7 +1827,7 @@
           <a:p>
             <a:fld id="{451BDFE6-D27D-4DA7-953E-74377D1BCDB7}" type="datetimeFigureOut">
               <a:rPr lang="en-US" smtClean="0"/>
-              <a:t>8/13/17</a:t>
+              <a:t>8/9/18</a:t>
             </a:fld>
             <a:endParaRPr lang="en-US"/>
           </a:p>
@@ -1842,7 +1838,7 @@
           <p:cNvPr id="8" name="Footer Placeholder 7">
             <a:extLst>
               <a:ext uri="{FF2B5EF4-FFF2-40B4-BE49-F238E27FC236}">
-                <a16:creationId xmlns:a16="http://schemas.microsoft.com/office/drawing/2014/main" xmlns="" id="{FE333A57-FFEE-412E-96B1-6F1A87CFE6F4}"/>
+                <a16:creationId xmlns:a16="http://schemas.microsoft.com/office/drawing/2014/main" id="{FE333A57-FFEE-412E-96B1-6F1A87CFE6F4}"/>
               </a:ext>
             </a:extLst>
           </p:cNvPr>
@@ -1867,7 +1863,7 @@
           <p:cNvPr id="9" name="Slide Number Placeholder 8">
             <a:extLst>
               <a:ext uri="{FF2B5EF4-FFF2-40B4-BE49-F238E27FC236}">
-                <a16:creationId xmlns:a16="http://schemas.microsoft.com/office/drawing/2014/main" xmlns="" id="{0D4B4C94-2DF4-481D-8EA4-BC3E7708E639}"/>
+                <a16:creationId xmlns:a16="http://schemas.microsoft.com/office/drawing/2014/main" id="{0D4B4C94-2DF4-481D-8EA4-BC3E7708E639}"/>
               </a:ext>
             </a:extLst>
           </p:cNvPr>
@@ -1926,7 +1922,7 @@
           <p:cNvPr id="2" name="Title 1">
             <a:extLst>
               <a:ext uri="{FF2B5EF4-FFF2-40B4-BE49-F238E27FC236}">
-                <a16:creationId xmlns:a16="http://schemas.microsoft.com/office/drawing/2014/main" xmlns="" id="{054ACC72-BE60-4AC8-AED9-D697627D5E9A}"/>
+                <a16:creationId xmlns:a16="http://schemas.microsoft.com/office/drawing/2014/main" id="{054ACC72-BE60-4AC8-AED9-D697627D5E9A}"/>
               </a:ext>
             </a:extLst>
           </p:cNvPr>
@@ -1954,7 +1950,7 @@
           <p:cNvPr id="3" name="Date Placeholder 2">
             <a:extLst>
               <a:ext uri="{FF2B5EF4-FFF2-40B4-BE49-F238E27FC236}">
-                <a16:creationId xmlns:a16="http://schemas.microsoft.com/office/drawing/2014/main" xmlns="" id="{737815A1-906B-4F66-A9B3-F1BF9C4A8CE8}"/>
+                <a16:creationId xmlns:a16="http://schemas.microsoft.com/office/drawing/2014/main" id="{737815A1-906B-4F66-A9B3-F1BF9C4A8CE8}"/>
               </a:ext>
             </a:extLst>
           </p:cNvPr>
@@ -1972,7 +1968,7 @@
           <a:p>
             <a:fld id="{451BDFE6-D27D-4DA7-953E-74377D1BCDB7}" type="datetimeFigureOut">
               <a:rPr lang="en-US" smtClean="0"/>
-              <a:t>8/13/17</a:t>
+              <a:t>8/9/18</a:t>
             </a:fld>
             <a:endParaRPr lang="en-US"/>
           </a:p>
@@ -1983,7 +1979,7 @@
           <p:cNvPr id="4" name="Footer Placeholder 3">
             <a:extLst>
               <a:ext uri="{FF2B5EF4-FFF2-40B4-BE49-F238E27FC236}">
-                <a16:creationId xmlns:a16="http://schemas.microsoft.com/office/drawing/2014/main" xmlns="" id="{52CC1920-2E05-43BD-8393-B40C139EA61D}"/>
+                <a16:creationId xmlns:a16="http://schemas.microsoft.com/office/drawing/2014/main" id="{52CC1920-2E05-43BD-8393-B40C139EA61D}"/>
               </a:ext>
             </a:extLst>
           </p:cNvPr>
@@ -2008,7 +2004,7 @@
           <p:cNvPr id="5" name="Slide Number Placeholder 4">
             <a:extLst>
               <a:ext uri="{FF2B5EF4-FFF2-40B4-BE49-F238E27FC236}">
-                <a16:creationId xmlns:a16="http://schemas.microsoft.com/office/drawing/2014/main" xmlns="" id="{716CB1B6-4B6D-4810-942D-ABDCFC302B2D}"/>
+                <a16:creationId xmlns:a16="http://schemas.microsoft.com/office/drawing/2014/main" id="{716CB1B6-4B6D-4810-942D-ABDCFC302B2D}"/>
               </a:ext>
             </a:extLst>
           </p:cNvPr>
@@ -2067,7 +2063,7 @@
           <p:cNvPr id="2" name="Date Placeholder 1">
             <a:extLst>
               <a:ext uri="{FF2B5EF4-FFF2-40B4-BE49-F238E27FC236}">
-                <a16:creationId xmlns:a16="http://schemas.microsoft.com/office/drawing/2014/main" xmlns="" id="{E44B6B29-4D1C-4667-807D-F14B8EBEC8C3}"/>
+                <a16:creationId xmlns:a16="http://schemas.microsoft.com/office/drawing/2014/main" id="{E44B6B29-4D1C-4667-807D-F14B8EBEC8C3}"/>
               </a:ext>
             </a:extLst>
           </p:cNvPr>
@@ -2085,7 +2081,7 @@
           <a:p>
             <a:fld id="{451BDFE6-D27D-4DA7-953E-74377D1BCDB7}" type="datetimeFigureOut">
               <a:rPr lang="en-US" smtClean="0"/>
-              <a:t>8/13/17</a:t>
+              <a:t>8/9/18</a:t>
             </a:fld>
             <a:endParaRPr lang="en-US"/>
           </a:p>
@@ -2096,7 +2092,7 @@
           <p:cNvPr id="3" name="Footer Placeholder 2">
             <a:extLst>
               <a:ext uri="{FF2B5EF4-FFF2-40B4-BE49-F238E27FC236}">
-                <a16:creationId xmlns:a16="http://schemas.microsoft.com/office/drawing/2014/main" xmlns="" id="{ED0C9340-C0E5-46AE-899A-00E9F8439C91}"/>
+                <a16:creationId xmlns:a16="http://schemas.microsoft.com/office/drawing/2014/main" id="{ED0C9340-C0E5-46AE-899A-00E9F8439C91}"/>
               </a:ext>
             </a:extLst>
           </p:cNvPr>
@@ -2121,7 +2117,7 @@
           <p:cNvPr id="4" name="Slide Number Placeholder 3">
             <a:extLst>
               <a:ext uri="{FF2B5EF4-FFF2-40B4-BE49-F238E27FC236}">
-                <a16:creationId xmlns:a16="http://schemas.microsoft.com/office/drawing/2014/main" xmlns="" id="{E5732DE3-0F86-48EB-BEE6-6E0B730CB031}"/>
+                <a16:creationId xmlns:a16="http://schemas.microsoft.com/office/drawing/2014/main" id="{E5732DE3-0F86-48EB-BEE6-6E0B730CB031}"/>
               </a:ext>
             </a:extLst>
           </p:cNvPr>
@@ -2180,7 +2176,7 @@
           <p:cNvPr id="2" name="Title 1">
             <a:extLst>
               <a:ext uri="{FF2B5EF4-FFF2-40B4-BE49-F238E27FC236}">
-                <a16:creationId xmlns:a16="http://schemas.microsoft.com/office/drawing/2014/main" xmlns="" id="{61AFEC77-2914-4BB9-84D7-F563C9B344E8}"/>
+                <a16:creationId xmlns:a16="http://schemas.microsoft.com/office/drawing/2014/main" id="{61AFEC77-2914-4BB9-84D7-F563C9B344E8}"/>
               </a:ext>
             </a:extLst>
           </p:cNvPr>
@@ -2217,7 +2213,7 @@
           <p:cNvPr id="3" name="Content Placeholder 2">
             <a:extLst>
               <a:ext uri="{FF2B5EF4-FFF2-40B4-BE49-F238E27FC236}">
-                <a16:creationId xmlns:a16="http://schemas.microsoft.com/office/drawing/2014/main" xmlns="" id="{6DB50B70-24F1-4F69-B803-55BBA8189300}"/>
+                <a16:creationId xmlns:a16="http://schemas.microsoft.com/office/drawing/2014/main" id="{6DB50B70-24F1-4F69-B803-55BBA8189300}"/>
               </a:ext>
             </a:extLst>
           </p:cNvPr>
@@ -2307,7 +2303,7 @@
           <p:cNvPr id="4" name="Text Placeholder 3">
             <a:extLst>
               <a:ext uri="{FF2B5EF4-FFF2-40B4-BE49-F238E27FC236}">
-                <a16:creationId xmlns:a16="http://schemas.microsoft.com/office/drawing/2014/main" xmlns="" id="{16D722E7-B608-486B-B7B7-8DB161EB53C3}"/>
+                <a16:creationId xmlns:a16="http://schemas.microsoft.com/office/drawing/2014/main" id="{16D722E7-B608-486B-B7B7-8DB161EB53C3}"/>
               </a:ext>
             </a:extLst>
           </p:cNvPr>
@@ -2378,7 +2374,7 @@
           <p:cNvPr id="5" name="Date Placeholder 4">
             <a:extLst>
               <a:ext uri="{FF2B5EF4-FFF2-40B4-BE49-F238E27FC236}">
-                <a16:creationId xmlns:a16="http://schemas.microsoft.com/office/drawing/2014/main" xmlns="" id="{24AB8A04-D83C-43CF-B315-49E502ACEBA9}"/>
+                <a16:creationId xmlns:a16="http://schemas.microsoft.com/office/drawing/2014/main" id="{24AB8A04-D83C-43CF-B315-49E502ACEBA9}"/>
               </a:ext>
             </a:extLst>
           </p:cNvPr>
@@ -2396,7 +2392,7 @@
           <a:p>
             <a:fld id="{451BDFE6-D27D-4DA7-953E-74377D1BCDB7}" type="datetimeFigureOut">
               <a:rPr lang="en-US" smtClean="0"/>
-              <a:t>8/13/17</a:t>
+              <a:t>8/9/18</a:t>
             </a:fld>
             <a:endParaRPr lang="en-US"/>
           </a:p>
@@ -2407,7 +2403,7 @@
           <p:cNvPr id="6" name="Footer Placeholder 5">
             <a:extLst>
               <a:ext uri="{FF2B5EF4-FFF2-40B4-BE49-F238E27FC236}">
-                <a16:creationId xmlns:a16="http://schemas.microsoft.com/office/drawing/2014/main" xmlns="" id="{B88710BE-9B1A-4D96-9FED-8E57CD596FF4}"/>
+                <a16:creationId xmlns:a16="http://schemas.microsoft.com/office/drawing/2014/main" id="{B88710BE-9B1A-4D96-9FED-8E57CD596FF4}"/>
               </a:ext>
             </a:extLst>
           </p:cNvPr>
@@ -2432,7 +2428,7 @@
           <p:cNvPr id="7" name="Slide Number Placeholder 6">
             <a:extLst>
               <a:ext uri="{FF2B5EF4-FFF2-40B4-BE49-F238E27FC236}">
-                <a16:creationId xmlns:a16="http://schemas.microsoft.com/office/drawing/2014/main" xmlns="" id="{60E2295E-4E22-4253-96B7-2033178792DE}"/>
+                <a16:creationId xmlns:a16="http://schemas.microsoft.com/office/drawing/2014/main" id="{60E2295E-4E22-4253-96B7-2033178792DE}"/>
               </a:ext>
             </a:extLst>
           </p:cNvPr>
@@ -2491,7 +2487,7 @@
           <p:cNvPr id="2" name="Title 1">
             <a:extLst>
               <a:ext uri="{FF2B5EF4-FFF2-40B4-BE49-F238E27FC236}">
-                <a16:creationId xmlns:a16="http://schemas.microsoft.com/office/drawing/2014/main" xmlns="" id="{840D861A-BFE2-4DEB-9604-3B41150B3941}"/>
+                <a16:creationId xmlns:a16="http://schemas.microsoft.com/office/drawing/2014/main" id="{840D861A-BFE2-4DEB-9604-3B41150B3941}"/>
               </a:ext>
             </a:extLst>
           </p:cNvPr>
@@ -2528,7 +2524,7 @@
           <p:cNvPr id="3" name="Picture Placeholder 2">
             <a:extLst>
               <a:ext uri="{FF2B5EF4-FFF2-40B4-BE49-F238E27FC236}">
-                <a16:creationId xmlns:a16="http://schemas.microsoft.com/office/drawing/2014/main" xmlns="" id="{E70776C9-E85E-4C0B-ABFC-7427CC4847D7}"/>
+                <a16:creationId xmlns:a16="http://schemas.microsoft.com/office/drawing/2014/main" id="{E70776C9-E85E-4C0B-ABFC-7427CC4847D7}"/>
               </a:ext>
             </a:extLst>
           </p:cNvPr>
@@ -2595,7 +2591,7 @@
           <p:cNvPr id="4" name="Text Placeholder 3">
             <a:extLst>
               <a:ext uri="{FF2B5EF4-FFF2-40B4-BE49-F238E27FC236}">
-                <a16:creationId xmlns:a16="http://schemas.microsoft.com/office/drawing/2014/main" xmlns="" id="{2A467B6E-00B6-4B68-8918-C2BEA2519D31}"/>
+                <a16:creationId xmlns:a16="http://schemas.microsoft.com/office/drawing/2014/main" id="{2A467B6E-00B6-4B68-8918-C2BEA2519D31}"/>
               </a:ext>
             </a:extLst>
           </p:cNvPr>
@@ -2666,7 +2662,7 @@
           <p:cNvPr id="5" name="Date Placeholder 4">
             <a:extLst>
               <a:ext uri="{FF2B5EF4-FFF2-40B4-BE49-F238E27FC236}">
-                <a16:creationId xmlns:a16="http://schemas.microsoft.com/office/drawing/2014/main" xmlns="" id="{42564AC2-B11C-46DC-89EE-E7D09C75D434}"/>
+                <a16:creationId xmlns:a16="http://schemas.microsoft.com/office/drawing/2014/main" id="{42564AC2-B11C-46DC-89EE-E7D09C75D434}"/>
               </a:ext>
             </a:extLst>
           </p:cNvPr>
@@ -2684,7 +2680,7 @@
           <a:p>
             <a:fld id="{451BDFE6-D27D-4DA7-953E-74377D1BCDB7}" type="datetimeFigureOut">
               <a:rPr lang="en-US" smtClean="0"/>
-              <a:t>8/13/17</a:t>
+              <a:t>8/9/18</a:t>
             </a:fld>
             <a:endParaRPr lang="en-US"/>
           </a:p>
@@ -2695,7 +2691,7 @@
           <p:cNvPr id="6" name="Footer Placeholder 5">
             <a:extLst>
               <a:ext uri="{FF2B5EF4-FFF2-40B4-BE49-F238E27FC236}">
-                <a16:creationId xmlns:a16="http://schemas.microsoft.com/office/drawing/2014/main" xmlns="" id="{2E57BAEE-8782-453E-A6D8-A6EFF77C6EEE}"/>
+                <a16:creationId xmlns:a16="http://schemas.microsoft.com/office/drawing/2014/main" id="{2E57BAEE-8782-453E-A6D8-A6EFF77C6EEE}"/>
               </a:ext>
             </a:extLst>
           </p:cNvPr>
@@ -2720,7 +2716,7 @@
           <p:cNvPr id="7" name="Slide Number Placeholder 6">
             <a:extLst>
               <a:ext uri="{FF2B5EF4-FFF2-40B4-BE49-F238E27FC236}">
-                <a16:creationId xmlns:a16="http://schemas.microsoft.com/office/drawing/2014/main" xmlns="" id="{8168AD34-DA13-4702-993D-350158129410}"/>
+                <a16:creationId xmlns:a16="http://schemas.microsoft.com/office/drawing/2014/main" id="{8168AD34-DA13-4702-993D-350158129410}"/>
               </a:ext>
             </a:extLst>
           </p:cNvPr>
@@ -2784,7 +2780,7 @@
           <p:cNvPr id="2" name="Title Placeholder 1">
             <a:extLst>
               <a:ext uri="{FF2B5EF4-FFF2-40B4-BE49-F238E27FC236}">
-                <a16:creationId xmlns:a16="http://schemas.microsoft.com/office/drawing/2014/main" xmlns="" id="{61F27013-F3FD-4B7F-B974-C054F1B2C67A}"/>
+                <a16:creationId xmlns:a16="http://schemas.microsoft.com/office/drawing/2014/main" id="{61F27013-F3FD-4B7F-B974-C054F1B2C67A}"/>
               </a:ext>
             </a:extLst>
           </p:cNvPr>
@@ -2822,7 +2818,7 @@
           <p:cNvPr id="3" name="Text Placeholder 2">
             <a:extLst>
               <a:ext uri="{FF2B5EF4-FFF2-40B4-BE49-F238E27FC236}">
-                <a16:creationId xmlns:a16="http://schemas.microsoft.com/office/drawing/2014/main" xmlns="" id="{B6AE2453-3670-4A3C-A6CF-03070062AEB1}"/>
+                <a16:creationId xmlns:a16="http://schemas.microsoft.com/office/drawing/2014/main" id="{B6AE2453-3670-4A3C-A6CF-03070062AEB1}"/>
               </a:ext>
             </a:extLst>
           </p:cNvPr>
@@ -2889,7 +2885,7 @@
           <p:cNvPr id="4" name="Date Placeholder 3">
             <a:extLst>
               <a:ext uri="{FF2B5EF4-FFF2-40B4-BE49-F238E27FC236}">
-                <a16:creationId xmlns:a16="http://schemas.microsoft.com/office/drawing/2014/main" xmlns="" id="{008FF460-549D-41FF-BC9F-A8635A4CE356}"/>
+                <a16:creationId xmlns:a16="http://schemas.microsoft.com/office/drawing/2014/main" id="{008FF460-549D-41FF-BC9F-A8635A4CE356}"/>
               </a:ext>
             </a:extLst>
           </p:cNvPr>
@@ -2925,7 +2921,7 @@
           <a:p>
             <a:fld id="{451BDFE6-D27D-4DA7-953E-74377D1BCDB7}" type="datetimeFigureOut">
               <a:rPr lang="en-US" smtClean="0"/>
-              <a:t>8/13/17</a:t>
+              <a:t>8/9/18</a:t>
             </a:fld>
             <a:endParaRPr lang="en-US"/>
           </a:p>
@@ -2936,7 +2932,7 @@
           <p:cNvPr id="5" name="Footer Placeholder 4">
             <a:extLst>
               <a:ext uri="{FF2B5EF4-FFF2-40B4-BE49-F238E27FC236}">
-                <a16:creationId xmlns:a16="http://schemas.microsoft.com/office/drawing/2014/main" xmlns="" id="{9D1AB9C2-031E-4792-B392-685FDF866D61}"/>
+                <a16:creationId xmlns:a16="http://schemas.microsoft.com/office/drawing/2014/main" id="{9D1AB9C2-031E-4792-B392-685FDF866D61}"/>
               </a:ext>
             </a:extLst>
           </p:cNvPr>
@@ -2979,7 +2975,7 @@
           <p:cNvPr id="6" name="Slide Number Placeholder 5">
             <a:extLst>
               <a:ext uri="{FF2B5EF4-FFF2-40B4-BE49-F238E27FC236}">
-                <a16:creationId xmlns:a16="http://schemas.microsoft.com/office/drawing/2014/main" xmlns="" id="{FDDD539C-2CA6-4C6F-AE2A-4F70D0E6FD14}"/>
+                <a16:creationId xmlns:a16="http://schemas.microsoft.com/office/drawing/2014/main" id="{FDDD539C-2CA6-4C6F-AE2A-4F70D0E6FD14}"/>
               </a:ext>
             </a:extLst>
           </p:cNvPr>
@@ -3347,7 +3343,7 @@
           <p:cNvPr id="2" name="Title 1">
             <a:extLst>
               <a:ext uri="{FF2B5EF4-FFF2-40B4-BE49-F238E27FC236}">
-                <a16:creationId xmlns:a16="http://schemas.microsoft.com/office/drawing/2014/main" xmlns="" id="{02EF250A-248E-4363-BE86-040330730565}"/>
+                <a16:creationId xmlns:a16="http://schemas.microsoft.com/office/drawing/2014/main" id="{02EF250A-248E-4363-BE86-040330730565}"/>
               </a:ext>
             </a:extLst>
           </p:cNvPr>
@@ -3375,63 +3371,19 @@
               <a:t>User’s Guide: </a:t>
             </a:r>
             <a:r>
-              <a:rPr lang="en-US" sz="4000" b="1" dirty="0" err="1" smtClean="0"/>
+              <a:rPr lang="en-US" sz="4000" b="1" dirty="0" err="1"/>
               <a:t>UniProt_reference_proteome_manager.py</a:t>
-            </a:r>
-            <a:r>
-              <a:rPr lang="en-US" sz="4000" dirty="0"/>
-              <a:t/>
             </a:r>
             <a:br>
               <a:rPr lang="en-US" sz="4000" dirty="0"/>
             </a:br>
             <a:r>
-              <a:rPr lang="en-US" sz="3600" dirty="0" smtClean="0"/>
-              <a:t>August </a:t>
-            </a:r>
-            <a:r>
               <a:rPr lang="en-US" sz="3600" dirty="0"/>
-              <a:t>2017</a:t>
-            </a:r>
-          </a:p>
-        </p:txBody>
-      </p:sp>
-      <p:pic>
-        <p:nvPicPr>
-          <p:cNvPr id="5" name="Picture 4">
-            <a:extLst>
-              <a:ext uri="{FF2B5EF4-FFF2-40B4-BE49-F238E27FC236}">
-                <a16:creationId xmlns:a16="http://schemas.microsoft.com/office/drawing/2014/main" xmlns="" id="{02A24FEA-A5B8-4AA7-9A1C-B4A60F59BEF6}"/>
-              </a:ext>
-            </a:extLst>
-          </p:cNvPr>
-          <p:cNvPicPr>
-            <a:picLocks noChangeAspect="1"/>
-          </p:cNvPicPr>
-          <p:nvPr/>
-        </p:nvPicPr>
-        <p:blipFill>
-          <a:blip r:embed="rId2">
-            <a:extLst>
-              <a:ext uri="{28A0092B-C50C-407E-A947-70E740481C1C}">
-                <a14:useLocalDpi xmlns:a14="http://schemas.microsoft.com/office/drawing/2010/main" val="0"/>
-              </a:ext>
-            </a:extLst>
-          </a:blip>
-          <a:stretch>
-            <a:fillRect/>
-          </a:stretch>
-        </p:blipFill>
-        <p:spPr>
-          <a:xfrm>
-            <a:off x="1845930" y="1780355"/>
-            <a:ext cx="8500140" cy="4959256"/>
-          </a:xfrm>
-          <a:prstGeom prst="rect">
-            <a:avLst/>
-          </a:prstGeom>
-        </p:spPr>
-      </p:pic>
+              <a:t>August 2017</a:t>
+            </a:r>
+          </a:p>
+        </p:txBody>
+      </p:sp>
     </p:spTree>
     <p:extLst>
       <p:ext uri="{BB962C8B-B14F-4D97-AF65-F5344CB8AC3E}">
@@ -3442,13 +3394,6 @@
   <p:clrMapOvr>
     <a:masterClrMapping/>
   </p:clrMapOvr>
-  <p:timing>
-    <p:tnLst>
-      <p:par>
-        <p:cTn id="1" dur="indefinite" restart="never" nodeType="tmRoot"/>
-      </p:par>
-    </p:tnLst>
-  </p:timing>
 </p:sld>
 </file>
 
@@ -3474,7 +3419,7 @@
           <p:cNvPr id="2" name="Title 1">
             <a:extLst>
               <a:ext uri="{FF2B5EF4-FFF2-40B4-BE49-F238E27FC236}">
-                <a16:creationId xmlns:a16="http://schemas.microsoft.com/office/drawing/2014/main" xmlns="" id="{2075EE21-29F4-4890-B89B-0EC185D9F24C}"/>
+                <a16:creationId xmlns:a16="http://schemas.microsoft.com/office/drawing/2014/main" id="{2075EE21-29F4-4890-B89B-0EC185D9F24C}"/>
               </a:ext>
             </a:extLst>
           </p:cNvPr>
@@ -3503,7 +3448,7 @@
           <p:cNvPr id="7" name="Content Placeholder 6">
             <a:extLst>
               <a:ext uri="{FF2B5EF4-FFF2-40B4-BE49-F238E27FC236}">
-                <a16:creationId xmlns:a16="http://schemas.microsoft.com/office/drawing/2014/main" xmlns="" id="{5B1CDF20-C512-4DD1-AB5F-950585BA9ED7}"/>
+                <a16:creationId xmlns:a16="http://schemas.microsoft.com/office/drawing/2014/main" id="{5B1CDF20-C512-4DD1-AB5F-950585BA9ED7}"/>
               </a:ext>
             </a:extLst>
           </p:cNvPr>
@@ -3538,7 +3483,7 @@
           <p:cNvPr id="8" name="TextBox 7">
             <a:extLst>
               <a:ext uri="{FF2B5EF4-FFF2-40B4-BE49-F238E27FC236}">
-                <a16:creationId xmlns:a16="http://schemas.microsoft.com/office/drawing/2014/main" xmlns="" id="{0894BCC1-2F75-4534-8399-31AD4B6044D4}"/>
+                <a16:creationId xmlns:a16="http://schemas.microsoft.com/office/drawing/2014/main" id="{0894BCC1-2F75-4534-8399-31AD4B6044D4}"/>
               </a:ext>
             </a:extLst>
           </p:cNvPr>
@@ -3575,15 +3520,7 @@
             </a:pPr>
             <a:r>
               <a:rPr lang="en-US" dirty="0"/>
-              <a:t>“Canonical #</a:t>
-            </a:r>
-            <a:r>
-              <a:rPr lang="en-US" dirty="0" smtClean="0"/>
-              <a:t>”: </a:t>
-            </a:r>
-            <a:r>
-              <a:rPr lang="en-US" dirty="0"/>
-              <a:t>outputs the number of canonical sequences in the database</a:t>
+              <a:t>“Canonical #”: outputs the number of canonical sequences in the database</a:t>
             </a:r>
           </a:p>
           <a:p>
@@ -3591,12 +3528,8 @@
               <a:buAutoNum type="arabicPeriod"/>
             </a:pPr>
             <a:r>
-              <a:rPr lang="en-US" dirty="0" smtClean="0"/>
-              <a:t>“Isoform #”: </a:t>
-            </a:r>
-            <a:r>
-              <a:rPr lang="en-US" dirty="0"/>
-              <a:t>outputs the number of isoform sequences in the database</a:t>
+              <a:rPr lang="en-US" dirty="0"/>
+              <a:t>“Isoform #”: outputs the number of isoform sequences in the database</a:t>
             </a:r>
           </a:p>
           <a:p>
@@ -3666,7 +3599,7 @@
           <p:cNvPr id="2" name="Title 1">
             <a:extLst>
               <a:ext uri="{FF2B5EF4-FFF2-40B4-BE49-F238E27FC236}">
-                <a16:creationId xmlns:a16="http://schemas.microsoft.com/office/drawing/2014/main" xmlns="" id="{584AFD2A-5F81-4445-9349-B8531B764232}"/>
+                <a16:creationId xmlns:a16="http://schemas.microsoft.com/office/drawing/2014/main" id="{584AFD2A-5F81-4445-9349-B8531B764232}"/>
               </a:ext>
             </a:extLst>
           </p:cNvPr>
@@ -3695,7 +3628,7 @@
           <p:cNvPr id="6" name="TextBox 5">
             <a:extLst>
               <a:ext uri="{FF2B5EF4-FFF2-40B4-BE49-F238E27FC236}">
-                <a16:creationId xmlns:a16="http://schemas.microsoft.com/office/drawing/2014/main" xmlns="" id="{65960FA9-2810-402A-BDE5-DE03E290CA4E}"/>
+                <a16:creationId xmlns:a16="http://schemas.microsoft.com/office/drawing/2014/main" id="{65960FA9-2810-402A-BDE5-DE03E290CA4E}"/>
               </a:ext>
             </a:extLst>
           </p:cNvPr>
@@ -3761,15 +3694,7 @@
             </a:pPr>
             <a:r>
               <a:rPr lang="en-US" dirty="0"/>
-              <a:t>“Save </a:t>
-            </a:r>
-            <a:r>
-              <a:rPr lang="en-US" dirty="0" smtClean="0"/>
-              <a:t>Default Species”: </a:t>
-            </a:r>
-            <a:r>
-              <a:rPr lang="en-US" dirty="0"/>
-              <a:t>saves all databases in the right display table (Selected Proteomes) to a defaults file in the directory the user selects.</a:t>
+              <a:t>“Save Default Species”: saves all databases in the right display table (Selected Proteomes) to a defaults file in the directory the user selects.</a:t>
             </a:r>
           </a:p>
           <a:p>
@@ -3777,12 +3702,8 @@
               <a:buAutoNum type="arabicPeriod"/>
             </a:pPr>
             <a:r>
-              <a:rPr lang="en-US" dirty="0" smtClean="0"/>
-              <a:t>“Load Default Species”: </a:t>
-            </a:r>
-            <a:r>
-              <a:rPr lang="en-US" dirty="0"/>
-              <a:t>imports the databases stored in a defaults file to the right display table (Selected Proteomes)</a:t>
+              <a:rPr lang="en-US" dirty="0"/>
+              <a:t>“Load Default Species”: imports the databases stored in a defaults file to the right display table (Selected Proteomes)</a:t>
             </a:r>
           </a:p>
         </p:txBody>
@@ -3792,7 +3713,7 @@
           <p:cNvPr id="14" name="Content Placeholder 13">
             <a:extLst>
               <a:ext uri="{FF2B5EF4-FFF2-40B4-BE49-F238E27FC236}">
-                <a16:creationId xmlns:a16="http://schemas.microsoft.com/office/drawing/2014/main" xmlns="" id="{EAC578A9-F697-47E2-BB8A-8541315466E4}"/>
+                <a16:creationId xmlns:a16="http://schemas.microsoft.com/office/drawing/2014/main" id="{EAC578A9-F697-47E2-BB8A-8541315466E4}"/>
               </a:ext>
             </a:extLst>
           </p:cNvPr>
@@ -3857,7 +3778,7 @@
           <p:cNvPr id="2" name="Title 1">
             <a:extLst>
               <a:ext uri="{FF2B5EF4-FFF2-40B4-BE49-F238E27FC236}">
-                <a16:creationId xmlns:a16="http://schemas.microsoft.com/office/drawing/2014/main" xmlns="" id="{832CB0A4-DC24-4AB7-8883-0C3300AE67A9}"/>
+                <a16:creationId xmlns:a16="http://schemas.microsoft.com/office/drawing/2014/main" id="{832CB0A4-DC24-4AB7-8883-0C3300AE67A9}"/>
               </a:ext>
             </a:extLst>
           </p:cNvPr>
@@ -3891,7 +3812,7 @@
           <p:cNvPr id="6" name="TextBox 5">
             <a:extLst>
               <a:ext uri="{FF2B5EF4-FFF2-40B4-BE49-F238E27FC236}">
-                <a16:creationId xmlns:a16="http://schemas.microsoft.com/office/drawing/2014/main" xmlns="" id="{E06F40A9-D33F-409B-AC77-A395DDF26DAB}"/>
+                <a16:creationId xmlns:a16="http://schemas.microsoft.com/office/drawing/2014/main" id="{E06F40A9-D33F-409B-AC77-A395DDF26DAB}"/>
               </a:ext>
             </a:extLst>
           </p:cNvPr>
@@ -3920,47 +3841,23 @@
             </a:pPr>
             <a:r>
               <a:rPr lang="en-US" dirty="0"/>
-              <a:t>“</a:t>
-            </a:r>
-            <a:r>
-              <a:rPr lang="en-US" dirty="0" smtClean="0"/>
-              <a:t>Download”: </a:t>
-            </a:r>
-            <a:r>
-              <a:rPr lang="en-US" dirty="0"/>
-              <a:t>downloads all of the databases shown in the Selected Proteomes display table to </a:t>
-            </a:r>
-            <a:r>
-              <a:rPr lang="en-US" dirty="0" smtClean="0"/>
-              <a:t>a user </a:t>
-            </a:r>
-            <a:r>
-              <a:rPr lang="en-US" dirty="0"/>
-              <a:t>selected </a:t>
-            </a:r>
-            <a:r>
-              <a:rPr lang="en-US" dirty="0" smtClean="0"/>
-              <a:t>general container folder (</a:t>
-            </a:r>
-            <a:r>
-              <a:rPr lang="en-US" dirty="0" err="1" smtClean="0"/>
+              <a:t>“Download”: downloads all of the databases shown in the Selected Proteomes display table to a user selected general container folder (</a:t>
+            </a:r>
+            <a:r>
+              <a:rPr lang="en-US" dirty="0" err="1"/>
               <a:t>eg</a:t>
             </a:r>
             <a:r>
-              <a:rPr lang="en-US" dirty="0" smtClean="0"/>
+              <a:rPr lang="en-US" dirty="0"/>
               <a:t>. “</a:t>
             </a:r>
             <a:r>
-              <a:rPr lang="en-US" dirty="0" err="1" smtClean="0"/>
+              <a:rPr lang="en-US" dirty="0" err="1"/>
               <a:t>uniprot_downloads</a:t>
             </a:r>
             <a:r>
-              <a:rPr lang="en-US" dirty="0" smtClean="0"/>
-              <a:t>”). </a:t>
-            </a:r>
-            <a:r>
-              <a:rPr lang="en-US" dirty="0"/>
-              <a:t>Currently, “reference_proteome_manager.py” is configured to download only *.fasta.gz and *_additional.fasta.gz files from the </a:t>
+              <a:rPr lang="en-US" dirty="0"/>
+              <a:t>”). Currently, “reference_proteome_manager.py” is configured to download only *.fasta.gz and *_additional.fasta.gz files from the </a:t>
             </a:r>
             <a:r>
               <a:rPr lang="en-US" dirty="0" err="1"/>
@@ -3986,40 +3883,23 @@
             </a:r>
             <a:r>
               <a:rPr lang="en-US" dirty="0"/>
-              <a:t>_(date)” </a:t>
-            </a:r>
-            <a:r>
-              <a:rPr lang="en-US" dirty="0" smtClean="0"/>
-              <a:t>subfolder (inside general container folder), </a:t>
-            </a:r>
-            <a:r>
-              <a:rPr lang="en-US" dirty="0"/>
-              <a:t>where “date” is the release date of the databases </a:t>
-            </a:r>
-            <a:r>
-              <a:rPr lang="en-US" dirty="0" smtClean="0"/>
-              <a:t/>
+              <a:t>_(date)” subfolder (inside general container folder), where “date” is the release date of the databases </a:t>
             </a:r>
             <a:br>
-              <a:rPr lang="en-US" dirty="0" smtClean="0"/>
+              <a:rPr lang="en-US" dirty="0"/>
             </a:br>
             <a:r>
-              <a:rPr lang="en-US" dirty="0" smtClean="0"/>
+              <a:rPr lang="en-US" dirty="0"/>
               <a:t>(</a:t>
             </a:r>
             <a:r>
-              <a:rPr lang="en-US" dirty="0" err="1" smtClean="0"/>
+              <a:rPr lang="en-US" dirty="0" err="1"/>
               <a:t>ie</a:t>
             </a:r>
             <a:r>
               <a:rPr lang="en-US" dirty="0"/>
-              <a:t>. </a:t>
-            </a:r>
-            <a:r>
-              <a:rPr lang="en-US" dirty="0" smtClean="0"/>
-              <a:t>2017.07). </a:t>
-            </a:r>
-            <a:endParaRPr lang="en-US" dirty="0"/>
+              <a:t>. 2017.07). </a:t>
+            </a:r>
           </a:p>
           <a:p>
             <a:pPr marL="1314450" lvl="2" indent="-400050">
@@ -4028,15 +3908,7 @@
             </a:pPr>
             <a:r>
               <a:rPr lang="en-US" dirty="0"/>
-              <a:t>Each </a:t>
-            </a:r>
-            <a:r>
-              <a:rPr lang="en-US" dirty="0" smtClean="0"/>
-              <a:t>reference proteome will </a:t>
-            </a:r>
-            <a:r>
-              <a:rPr lang="en-US" dirty="0"/>
-              <a:t>have its own folder named in the following convention “(date)_(proteome ID)_(Species Name)”.</a:t>
+              <a:t>Each reference proteome will have its own folder named in the following convention “(date)_(proteome ID)_(Species Name)”.</a:t>
             </a:r>
           </a:p>
           <a:p>
@@ -4054,11 +3926,7 @@
             </a:r>
             <a:r>
               <a:rPr lang="en-US" dirty="0"/>
-              <a:t> files are then unzipped </a:t>
-            </a:r>
-            <a:r>
-              <a:rPr lang="en-US" dirty="0" smtClean="0"/>
-              <a:t>to *_</a:t>
+              <a:t> files are then unzipped to *_</a:t>
             </a:r>
             <a:r>
               <a:rPr lang="en-US" dirty="0" err="1"/>
@@ -4066,15 +3934,7 @@
             </a:r>
             <a:r>
               <a:rPr lang="en-US" dirty="0"/>
-              <a:t> </a:t>
-            </a:r>
-            <a:r>
-              <a:rPr lang="en-US" dirty="0" smtClean="0"/>
-              <a:t>files </a:t>
-            </a:r>
-            <a:r>
-              <a:rPr lang="en-US" dirty="0"/>
-              <a:t>and *_</a:t>
+              <a:t> files and *_</a:t>
             </a:r>
             <a:r>
               <a:rPr lang="en-US" dirty="0" err="1"/>
@@ -4082,31 +3942,15 @@
             </a:r>
             <a:r>
               <a:rPr lang="en-US" dirty="0"/>
-              <a:t> </a:t>
-            </a:r>
-            <a:r>
-              <a:rPr lang="en-US" dirty="0" smtClean="0"/>
-              <a:t>files that </a:t>
-            </a:r>
-            <a:r>
-              <a:rPr lang="en-US" dirty="0"/>
-              <a:t>are placed in the common </a:t>
-            </a:r>
-            <a:r>
-              <a:rPr lang="en-US" dirty="0" smtClean="0"/>
-              <a:t>“</a:t>
-            </a:r>
-            <a:r>
-              <a:rPr lang="en-US" dirty="0" err="1" smtClean="0"/>
+              <a:t> files that are placed in the common “</a:t>
+            </a:r>
+            <a:r>
+              <a:rPr lang="en-US" dirty="0" err="1"/>
               <a:t>UniProt</a:t>
             </a:r>
             <a:r>
-              <a:rPr lang="en-US" dirty="0" smtClean="0"/>
-              <a:t>_(date)” </a:t>
-            </a:r>
-            <a:r>
-              <a:rPr lang="en-US" dirty="0"/>
-              <a:t>folder. </a:t>
+              <a:rPr lang="en-US" dirty="0"/>
+              <a:t>_(date)” folder. </a:t>
             </a:r>
           </a:p>
           <a:p>
@@ -4116,15 +3960,7 @@
             </a:pPr>
             <a:r>
               <a:rPr lang="en-US" dirty="0"/>
-              <a:t>The naming convention for these files is </a:t>
-            </a:r>
-            <a:r>
-              <a:rPr lang="en-US" dirty="0" smtClean="0"/>
-              <a:t>“(version)_(proteome </a:t>
-            </a:r>
-            <a:r>
-              <a:rPr lang="en-US" dirty="0"/>
-              <a:t>ID)_(taxonomy ID)_(species name)_</a:t>
+              <a:t>The naming convention for these files is “(version)_(proteome ID)_(taxonomy ID)_(species name)_</a:t>
             </a:r>
             <a:r>
               <a:rPr lang="en-US" dirty="0" err="1"/>
@@ -4132,15 +3968,7 @@
             </a:r>
             <a:r>
               <a:rPr lang="en-US" dirty="0"/>
-              <a:t>” or </a:t>
-            </a:r>
-            <a:r>
-              <a:rPr lang="en-US" dirty="0" smtClean="0"/>
-              <a:t>“(version)_(proteome </a:t>
-            </a:r>
-            <a:r>
-              <a:rPr lang="en-US" dirty="0"/>
-              <a:t>ID)_(taxonomy ID)_(species name)_</a:t>
+              <a:t>” or “(version)_(proteome ID)_(taxonomy ID)_(species name)_</a:t>
             </a:r>
             <a:r>
               <a:rPr lang="en-US" dirty="0" err="1"/>
@@ -4166,13 +3994,8 @@
             </a:r>
             <a:r>
               <a:rPr lang="en-US" dirty="0"/>
-              <a:t> file includes both canonical and isoform sequences</a:t>
-            </a:r>
-            <a:r>
-              <a:rPr lang="en-US" dirty="0" smtClean="0"/>
-              <a:t>. Canonical sequences only are recommended for most use cases.</a:t>
-            </a:r>
-            <a:endParaRPr lang="en-US" dirty="0"/>
+              <a:t> file includes both canonical and isoform sequences. Canonical sequences only are recommended for most use cases.</a:t>
+            </a:r>
           </a:p>
           <a:p>
             <a:pPr marL="400050" indent="-400050">
@@ -4181,21 +4004,8 @@
             </a:pPr>
             <a:r>
               <a:rPr lang="en-US" dirty="0"/>
-              <a:t>“Quit”: will quit out of the program. If any changes have been made to the Selected Proteomes display table, the user will be prompted to save the current </a:t>
-            </a:r>
-            <a:r>
-              <a:rPr lang="en-US" dirty="0" smtClean="0"/>
-              <a:t>species list to </a:t>
-            </a:r>
-            <a:r>
-              <a:rPr lang="en-US" dirty="0"/>
-              <a:t>a new defaults file</a:t>
-            </a:r>
-            <a:r>
-              <a:rPr lang="en-US" dirty="0" smtClean="0"/>
-              <a:t>. Default species lists make it easier to regularly update common reference proteomes.</a:t>
-            </a:r>
-            <a:endParaRPr lang="en-US" dirty="0"/>
+              <a:t>“Quit”: will quit out of the program. If any changes have been made to the Selected Proteomes display table, the user will be prompted to save the current species list to a new defaults file. Default species lists make it easier to regularly update common reference proteomes.</a:t>
+            </a:r>
           </a:p>
         </p:txBody>
       </p:sp>
@@ -4204,7 +4014,7 @@
           <p:cNvPr id="8" name="Content Placeholder 7">
             <a:extLst>
               <a:ext uri="{FF2B5EF4-FFF2-40B4-BE49-F238E27FC236}">
-                <a16:creationId xmlns:a16="http://schemas.microsoft.com/office/drawing/2014/main" xmlns="" id="{526C8212-693E-4E3E-AFA7-CAD8E1598AD2}"/>
+                <a16:creationId xmlns:a16="http://schemas.microsoft.com/office/drawing/2014/main" id="{526C8212-693E-4E3E-AFA7-CAD8E1598AD2}"/>
               </a:ext>
             </a:extLst>
           </p:cNvPr>
@@ -4269,7 +4079,7 @@
           <p:cNvPr id="2" name="Title 1">
             <a:extLst>
               <a:ext uri="{FF2B5EF4-FFF2-40B4-BE49-F238E27FC236}">
-                <a16:creationId xmlns:a16="http://schemas.microsoft.com/office/drawing/2014/main" xmlns="" id="{FA12A580-0275-4480-8506-FEAE56FC2296}"/>
+                <a16:creationId xmlns:a16="http://schemas.microsoft.com/office/drawing/2014/main" id="{FA12A580-0275-4480-8506-FEAE56FC2296}"/>
               </a:ext>
             </a:extLst>
           </p:cNvPr>
@@ -4298,7 +4108,7 @@
           <p:cNvPr id="7" name="Content Placeholder 6">
             <a:extLst>
               <a:ext uri="{FF2B5EF4-FFF2-40B4-BE49-F238E27FC236}">
-                <a16:creationId xmlns:a16="http://schemas.microsoft.com/office/drawing/2014/main" xmlns="" id="{229C5CEC-BDD6-4C88-AED9-4F31E0845898}"/>
+                <a16:creationId xmlns:a16="http://schemas.microsoft.com/office/drawing/2014/main" id="{229C5CEC-BDD6-4C88-AED9-4F31E0845898}"/>
               </a:ext>
             </a:extLst>
           </p:cNvPr>
@@ -4333,7 +4143,7 @@
           <p:cNvPr id="8" name="TextBox 7">
             <a:extLst>
               <a:ext uri="{FF2B5EF4-FFF2-40B4-BE49-F238E27FC236}">
-                <a16:creationId xmlns:a16="http://schemas.microsoft.com/office/drawing/2014/main" xmlns="" id="{3F32F08F-6B0E-46F7-A5BC-143020E90F93}"/>
+                <a16:creationId xmlns:a16="http://schemas.microsoft.com/office/drawing/2014/main" id="{3F32F08F-6B0E-46F7-A5BC-143020E90F93}"/>
               </a:ext>
             </a:extLst>
           </p:cNvPr>
@@ -4411,18 +4221,17 @@
           <a:lstStyle/>
           <a:p>
             <a:r>
-              <a:rPr lang="en-US" sz="4000" b="1" dirty="0" smtClean="0"/>
+              <a:rPr lang="en-US" sz="4000" b="1" dirty="0"/>
               <a:t>What is </a:t>
             </a:r>
             <a:r>
-              <a:rPr lang="en-US" sz="4000" b="1" dirty="0" err="1" smtClean="0"/>
+              <a:rPr lang="en-US" sz="4000" b="1" dirty="0" err="1"/>
               <a:t>UniProt_reference_proteome_manager</a:t>
             </a:r>
             <a:r>
-              <a:rPr lang="en-US" sz="4000" b="1" dirty="0" smtClean="0"/>
+              <a:rPr lang="en-US" sz="4000" b="1" dirty="0"/>
               <a:t>?</a:t>
             </a:r>
-            <a:endParaRPr lang="en-US" sz="4000" b="1" dirty="0"/>
           </a:p>
         </p:txBody>
       </p:sp>
@@ -4442,40 +4251,36 @@
           <a:lstStyle/>
           <a:p>
             <a:r>
-              <a:rPr lang="en-US" dirty="0" smtClean="0"/>
+              <a:rPr lang="en-US" dirty="0"/>
               <a:t>A GUI Python application to download and manage </a:t>
             </a:r>
             <a:r>
-              <a:rPr lang="en-US" dirty="0" err="1" smtClean="0"/>
+              <a:rPr lang="en-US" dirty="0" err="1"/>
               <a:t>UniProt</a:t>
             </a:r>
             <a:r>
-              <a:rPr lang="en-US" dirty="0" smtClean="0"/>
+              <a:rPr lang="en-US" dirty="0"/>
               <a:t> reference proteomes</a:t>
             </a:r>
           </a:p>
           <a:p>
             <a:r>
-              <a:rPr lang="en-US" dirty="0" smtClean="0"/>
+              <a:rPr lang="en-US" dirty="0"/>
               <a:t>Written by Delan Huang and Phil Wilmarth (</a:t>
             </a:r>
             <a:r>
-              <a:rPr lang="en-US" dirty="0" err="1" smtClean="0"/>
+              <a:rPr lang="en-US" dirty="0" err="1"/>
               <a:t>wilmarth@ohsu.edu</a:t>
             </a:r>
             <a:r>
-              <a:rPr lang="en-US" dirty="0" smtClean="0"/>
+              <a:rPr lang="en-US" dirty="0"/>
               <a:t>), OHSU</a:t>
             </a:r>
           </a:p>
           <a:p>
             <a:r>
-              <a:rPr lang="en-US" dirty="0" smtClean="0"/>
-              <a:t>Available at GitHub: </a:t>
-            </a:r>
-            <a:r>
-              <a:rPr lang="en-US" dirty="0"/>
-              <a:t>(https://</a:t>
+              <a:rPr lang="en-US" dirty="0"/>
+              <a:t>Available at GitHub: (https://</a:t>
             </a:r>
             <a:r>
               <a:rPr lang="en-US" dirty="0" err="1"/>
@@ -4493,14 +4298,12 @@
               <a:rPr lang="en-US" dirty="0"/>
               <a:t>)</a:t>
             </a:r>
-            <a:endParaRPr lang="en-US" dirty="0" smtClean="0"/>
-          </a:p>
-          <a:p>
-            <a:r>
-              <a:rPr lang="en-US" dirty="0" smtClean="0"/>
+          </a:p>
+          <a:p>
+            <a:r>
+              <a:rPr lang="en-US" dirty="0"/>
               <a:t>System requirements: Python 3 (developed and tested with v3.6) and an internet connection</a:t>
             </a:r>
-            <a:endParaRPr lang="en-US" dirty="0"/>
           </a:p>
         </p:txBody>
       </p:sp>
@@ -4514,13 +4317,6 @@
   <p:clrMapOvr>
     <a:masterClrMapping/>
   </p:clrMapOvr>
-  <p:timing>
-    <p:tnLst>
-      <p:par>
-        <p:cTn id="1" dur="indefinite" restart="never" nodeType="tmRoot"/>
-      </p:par>
-    </p:tnLst>
-  </p:timing>
 </p:sld>
 </file>
 
@@ -4557,18 +4353,17 @@
           <a:lstStyle/>
           <a:p>
             <a:r>
-              <a:rPr lang="en-US" b="1" dirty="0" smtClean="0"/>
+              <a:rPr lang="en-US" b="1" dirty="0"/>
               <a:t>What are </a:t>
             </a:r>
             <a:r>
-              <a:rPr lang="en-US" b="1" dirty="0" err="1" smtClean="0"/>
+              <a:rPr lang="en-US" b="1" dirty="0" err="1"/>
               <a:t>UniProt</a:t>
             </a:r>
             <a:r>
-              <a:rPr lang="en-US" b="1" dirty="0" smtClean="0"/>
+              <a:rPr lang="en-US" b="1" dirty="0"/>
               <a:t> reference proteomes?</a:t>
             </a:r>
-            <a:endParaRPr lang="en-US" b="1" dirty="0"/>
           </a:p>
         </p:txBody>
       </p:sp>
@@ -4588,13 +4383,13 @@
           <a:lstStyle/>
           <a:p>
             <a:r>
-              <a:rPr lang="en-US" dirty="0" smtClean="0"/>
+              <a:rPr lang="en-US" dirty="0"/>
               <a:t>High quality, complete proteomes that span the tree of life</a:t>
             </a:r>
           </a:p>
           <a:p>
             <a:r>
-              <a:rPr lang="en-US" dirty="0" smtClean="0"/>
+              <a:rPr lang="en-US" dirty="0"/>
               <a:t>See: </a:t>
             </a:r>
             <a:r>
@@ -4603,11 +4398,11 @@
               </a:rPr>
               <a:t>http://www.uniprot.org/help/reference_proteome</a:t>
             </a:r>
-            <a:endParaRPr lang="en-US" dirty="0" smtClean="0"/>
-          </a:p>
-          <a:p>
-            <a:r>
-              <a:rPr lang="en-US" dirty="0" smtClean="0"/>
+            <a:endParaRPr lang="en-US" dirty="0"/>
+          </a:p>
+          <a:p>
+            <a:r>
+              <a:rPr lang="en-US" dirty="0"/>
               <a:t>Reference proteome statistics (July 2017):</a:t>
             </a:r>
           </a:p>
@@ -4637,8 +4432,20 @@
                 <a:tableStyleId>{5C22544A-7EE6-4342-B048-85BDC9FD1C3A}</a:tableStyleId>
               </a:tblPr>
               <a:tblGrid>
-                <a:gridCol w="4064000"/>
-                <a:gridCol w="4064000"/>
+                <a:gridCol w="4064000">
+                  <a:extLst>
+                    <a:ext uri="{9D8B030D-6E8A-4147-A177-3AD203B41FA5}">
+                      <a16:colId xmlns:a16="http://schemas.microsoft.com/office/drawing/2014/main" val="20000"/>
+                    </a:ext>
+                  </a:extLst>
+                </a:gridCol>
+                <a:gridCol w="4064000">
+                  <a:extLst>
+                    <a:ext uri="{9D8B030D-6E8A-4147-A177-3AD203B41FA5}">
+                      <a16:colId xmlns:a16="http://schemas.microsoft.com/office/drawing/2014/main" val="20001"/>
+                    </a:ext>
+                  </a:extLst>
+                </a:gridCol>
               </a:tblGrid>
               <a:tr h="370840">
                 <a:tc>
@@ -4647,11 +4454,11 @@
                     <a:lstStyle/>
                     <a:p>
                       <a:r>
-                        <a:rPr lang="en-US" dirty="0" err="1" smtClean="0"/>
+                        <a:rPr lang="en-US" dirty="0" err="1"/>
                         <a:t>Phyogenetic</a:t>
                       </a:r>
                       <a:r>
-                        <a:rPr lang="en-US" baseline="0" dirty="0" smtClean="0"/>
+                        <a:rPr lang="en-US" baseline="0" dirty="0"/>
                         <a:t> Kingdom</a:t>
                       </a:r>
                       <a:endParaRPr lang="en-US" dirty="0"/>
@@ -4665,14 +4472,18 @@
                     <a:lstStyle/>
                     <a:p>
                       <a:r>
-                        <a:rPr lang="en-US" dirty="0" smtClean="0"/>
+                        <a:rPr lang="en-US" dirty="0"/>
                         <a:t>Number of proteomes</a:t>
                       </a:r>
-                      <a:endParaRPr lang="en-US" dirty="0"/>
                     </a:p>
                   </a:txBody>
                   <a:tcPr/>
                 </a:tc>
+                <a:extLst>
+                  <a:ext uri="{0D108BD9-81ED-4DB2-BD59-A6C34878D82A}">
+                    <a16:rowId xmlns:a16="http://schemas.microsoft.com/office/drawing/2014/main" val="10000"/>
+                  </a:ext>
+                </a:extLst>
               </a:tr>
               <a:tr h="370840">
                 <a:tc>
@@ -4681,10 +4492,9 @@
                     <a:lstStyle/>
                     <a:p>
                       <a:r>
-                        <a:rPr lang="en-US" dirty="0" smtClean="0"/>
+                        <a:rPr lang="en-US" dirty="0"/>
                         <a:t>Archaea</a:t>
                       </a:r>
-                      <a:endParaRPr lang="en-US" dirty="0"/>
                     </a:p>
                   </a:txBody>
                   <a:tcPr/>
@@ -4695,14 +4505,18 @@
                     <a:lstStyle/>
                     <a:p>
                       <a:r>
-                        <a:rPr lang="en-US" dirty="0" smtClean="0"/>
+                        <a:rPr lang="en-US" dirty="0"/>
                         <a:t>372</a:t>
                       </a:r>
-                      <a:endParaRPr lang="en-US" dirty="0"/>
                     </a:p>
                   </a:txBody>
                   <a:tcPr/>
                 </a:tc>
+                <a:extLst>
+                  <a:ext uri="{0D108BD9-81ED-4DB2-BD59-A6C34878D82A}">
+                    <a16:rowId xmlns:a16="http://schemas.microsoft.com/office/drawing/2014/main" val="10001"/>
+                  </a:ext>
+                </a:extLst>
               </a:tr>
               <a:tr h="370840">
                 <a:tc>
@@ -4711,10 +4525,9 @@
                     <a:lstStyle/>
                     <a:p>
                       <a:r>
-                        <a:rPr lang="en-US" dirty="0" smtClean="0"/>
+                        <a:rPr lang="en-US" dirty="0"/>
                         <a:t>Bacteria</a:t>
                       </a:r>
-                      <a:endParaRPr lang="en-US" dirty="0"/>
                     </a:p>
                   </a:txBody>
                   <a:tcPr/>
@@ -4725,14 +4538,18 @@
                     <a:lstStyle/>
                     <a:p>
                       <a:r>
-                        <a:rPr lang="en-US" dirty="0" smtClean="0"/>
+                        <a:rPr lang="en-US" dirty="0"/>
                         <a:t>6521</a:t>
                       </a:r>
-                      <a:endParaRPr lang="en-US" dirty="0"/>
                     </a:p>
                   </a:txBody>
                   <a:tcPr/>
                 </a:tc>
+                <a:extLst>
+                  <a:ext uri="{0D108BD9-81ED-4DB2-BD59-A6C34878D82A}">
+                    <a16:rowId xmlns:a16="http://schemas.microsoft.com/office/drawing/2014/main" val="10002"/>
+                  </a:ext>
+                </a:extLst>
               </a:tr>
               <a:tr h="370840">
                 <a:tc>
@@ -4741,7 +4558,7 @@
                     <a:lstStyle/>
                     <a:p>
                       <a:r>
-                        <a:rPr lang="en-US" dirty="0" err="1" smtClean="0"/>
+                        <a:rPr lang="en-US" dirty="0" err="1"/>
                         <a:t>Eukaryota</a:t>
                       </a:r>
                       <a:endParaRPr lang="en-US" dirty="0"/>
@@ -4755,14 +4572,18 @@
                     <a:lstStyle/>
                     <a:p>
                       <a:r>
-                        <a:rPr lang="en-US" dirty="0" smtClean="0"/>
+                        <a:rPr lang="en-US" dirty="0"/>
                         <a:t>993</a:t>
                       </a:r>
-                      <a:endParaRPr lang="en-US" dirty="0"/>
                     </a:p>
                   </a:txBody>
                   <a:tcPr/>
                 </a:tc>
+                <a:extLst>
+                  <a:ext uri="{0D108BD9-81ED-4DB2-BD59-A6C34878D82A}">
+                    <a16:rowId xmlns:a16="http://schemas.microsoft.com/office/drawing/2014/main" val="10003"/>
+                  </a:ext>
+                </a:extLst>
               </a:tr>
               <a:tr h="370840">
                 <a:tc>
@@ -4771,10 +4592,9 @@
                     <a:lstStyle/>
                     <a:p>
                       <a:r>
-                        <a:rPr lang="en-US" dirty="0" smtClean="0"/>
+                        <a:rPr lang="en-US" dirty="0"/>
                         <a:t>Viruses</a:t>
                       </a:r>
-                      <a:endParaRPr lang="en-US" dirty="0"/>
                     </a:p>
                   </a:txBody>
                   <a:tcPr/>
@@ -4785,14 +4605,18 @@
                     <a:lstStyle/>
                     <a:p>
                       <a:r>
-                        <a:rPr lang="en-US" dirty="0" smtClean="0"/>
+                        <a:rPr lang="en-US" dirty="0"/>
                         <a:t>506</a:t>
                       </a:r>
-                      <a:endParaRPr lang="en-US" dirty="0"/>
                     </a:p>
                   </a:txBody>
                   <a:tcPr/>
                 </a:tc>
+                <a:extLst>
+                  <a:ext uri="{0D108BD9-81ED-4DB2-BD59-A6C34878D82A}">
+                    <a16:rowId xmlns:a16="http://schemas.microsoft.com/office/drawing/2014/main" val="10004"/>
+                  </a:ext>
+                </a:extLst>
               </a:tr>
             </a:tbl>
           </a:graphicData>
@@ -4844,10 +4668,9 @@
           <a:lstStyle/>
           <a:p>
             <a:r>
-              <a:rPr lang="en-US" dirty="0" smtClean="0"/>
+              <a:rPr lang="en-US" dirty="0"/>
               <a:t>How to get reference proteomes?</a:t>
             </a:r>
-            <a:endParaRPr lang="en-US" dirty="0"/>
           </a:p>
         </p:txBody>
       </p:sp>
@@ -4867,70 +4690,49 @@
           <a:lstStyle/>
           <a:p>
             <a:r>
-              <a:rPr lang="en-US" dirty="0" smtClean="0"/>
+              <a:rPr lang="en-US" dirty="0"/>
               <a:t>Reference proteomes are available from </a:t>
             </a:r>
             <a:r>
-              <a:rPr lang="en-US" dirty="0" err="1" smtClean="0"/>
+              <a:rPr lang="en-US" dirty="0" err="1"/>
               <a:t>UniProt</a:t>
             </a:r>
             <a:r>
-              <a:rPr lang="en-US" dirty="0" smtClean="0"/>
-              <a:t> main web pages and at </a:t>
-            </a:r>
-            <a:r>
-              <a:rPr lang="en-US" dirty="0"/>
-              <a:t>the Proteomes page: </a:t>
+              <a:rPr lang="en-US" dirty="0"/>
+              <a:t> main web pages and at the Proteomes page: </a:t>
             </a:r>
             <a:r>
               <a:rPr lang="en-US" dirty="0">
                 <a:hlinkClick r:id="rId2"/>
               </a:rPr>
-              <a:t>http://www.uniprot.org/proteomes</a:t>
-            </a:r>
-            <a:r>
-              <a:rPr lang="en-US" dirty="0" smtClean="0">
-                <a:hlinkClick r:id="rId2"/>
-              </a:rPr>
-              <a:t>/</a:t>
-            </a:r>
-            <a:endParaRPr lang="en-US" dirty="0" smtClean="0"/>
-          </a:p>
-          <a:p>
-            <a:r>
-              <a:rPr lang="en-US" dirty="0" smtClean="0"/>
-              <a:t>They </a:t>
-            </a:r>
-            <a:r>
-              <a:rPr lang="en-US" dirty="0"/>
-              <a:t>are available via FTP at: </a:t>
+              <a:t>http://www.uniprot.org/proteomes/</a:t>
+            </a:r>
+            <a:endParaRPr lang="en-US" dirty="0"/>
+          </a:p>
+          <a:p>
+            <a:r>
+              <a:rPr lang="en-US" dirty="0"/>
+              <a:t>They are available via FTP at: </a:t>
             </a:r>
             <a:r>
               <a:rPr lang="en-US" dirty="0">
                 <a:hlinkClick r:id="rId3" action="ppaction://hlinkfile"/>
               </a:rPr>
-              <a:t>ftp://ftp.uniprot.org/pub/databases/uniprot/current_release/knowledgebase/reference_proteomes</a:t>
-            </a:r>
-            <a:r>
-              <a:rPr lang="en-US" dirty="0" smtClean="0">
-                <a:hlinkClick r:id="rId3" action="ppaction://hlinkfile"/>
-              </a:rPr>
-              <a:t>/</a:t>
-            </a:r>
-            <a:endParaRPr lang="en-US" dirty="0" smtClean="0"/>
-          </a:p>
-          <a:p>
-            <a:r>
-              <a:rPr lang="en-US" dirty="0" smtClean="0"/>
+              <a:t>ftp://ftp.uniprot.org/pub/databases/uniprot/current_release/knowledgebase/reference_proteomes/</a:t>
+            </a:r>
+            <a:endParaRPr lang="en-US" dirty="0"/>
+          </a:p>
+          <a:p>
+            <a:r>
+              <a:rPr lang="en-US" dirty="0"/>
               <a:t>Designation of canonical sequences and associated isoforms, and annotation of isoforms are superior for the FTP files</a:t>
             </a:r>
           </a:p>
           <a:p>
             <a:r>
-              <a:rPr lang="en-US" dirty="0" smtClean="0"/>
+              <a:rPr lang="en-US" dirty="0"/>
               <a:t>Reference proteome naming and multiple files per species make the FTP site challenging to navigate</a:t>
             </a:r>
-            <a:endParaRPr lang="en-US" dirty="0"/>
           </a:p>
         </p:txBody>
       </p:sp>
@@ -4980,18 +4782,13 @@
           <a:lstStyle/>
           <a:p>
             <a:r>
-              <a:rPr lang="en-US" b="1" dirty="0" err="1" smtClean="0"/>
+              <a:rPr lang="en-US" b="1" dirty="0" err="1"/>
               <a:t>UniProt_reference_proteome_manager</a:t>
             </a:r>
             <a:r>
-              <a:rPr lang="en-US" b="1" dirty="0" smtClean="0"/>
-              <a:t> </a:t>
-            </a:r>
-            <a:r>
-              <a:rPr lang="en-US" b="1" dirty="0" smtClean="0"/>
-              <a:t>helps</a:t>
-            </a:r>
-            <a:endParaRPr lang="en-US" b="1" dirty="0"/>
+              <a:rPr lang="en-US" b="1" dirty="0"/>
+              <a:t> helps</a:t>
+            </a:r>
           </a:p>
         </p:txBody>
       </p:sp>
@@ -5011,34 +4808,33 @@
           <a:lstStyle/>
           <a:p>
             <a:r>
-              <a:rPr lang="en-US" dirty="0" smtClean="0"/>
+              <a:rPr lang="en-US" dirty="0"/>
               <a:t>The App presents reference proteomes in an informative graphical user interface (GUI)</a:t>
             </a:r>
           </a:p>
           <a:p>
             <a:r>
-              <a:rPr lang="en-US" dirty="0" smtClean="0"/>
+              <a:rPr lang="en-US" dirty="0"/>
               <a:t>Reference proteomes are designated by species names and searching and filtering of the 8000+ proteomes is supported</a:t>
             </a:r>
           </a:p>
           <a:p>
             <a:r>
-              <a:rPr lang="en-US" dirty="0" smtClean="0"/>
+              <a:rPr lang="en-US" dirty="0"/>
               <a:t>Sets of user-defined default organisms are support to facilitate frequent downloading of common proteomes</a:t>
             </a:r>
           </a:p>
           <a:p>
             <a:r>
-              <a:rPr lang="en-US" dirty="0" smtClean="0"/>
+              <a:rPr lang="en-US" dirty="0"/>
               <a:t>Locating FTP files and downloading is automated</a:t>
             </a:r>
           </a:p>
           <a:p>
             <a:r>
-              <a:rPr lang="en-US" dirty="0" smtClean="0"/>
+              <a:rPr lang="en-US" dirty="0"/>
               <a:t>Reference proteome naming and file organization are standardized </a:t>
             </a:r>
-            <a:endParaRPr lang="en-US" dirty="0"/>
           </a:p>
         </p:txBody>
       </p:sp>
@@ -5090,15 +4886,11 @@
           <a:lstStyle/>
           <a:p>
             <a:r>
-              <a:rPr lang="en-US" sz="4000" b="1" dirty="0" smtClean="0"/>
-              <a:t>Running</a:t>
-            </a:r>
-            <a:r>
-              <a:rPr lang="en-US" sz="4000" b="1" dirty="0" smtClean="0"/>
-              <a:t> </a:t>
-            </a:r>
-            <a:r>
-              <a:rPr lang="en-US" sz="4000" b="1" dirty="0" err="1" smtClean="0"/>
+              <a:rPr lang="en-US" sz="4000" b="1" dirty="0"/>
+              <a:t>Running </a:t>
+            </a:r>
+            <a:r>
+              <a:rPr lang="en-US" sz="4000" b="1" dirty="0" err="1"/>
               <a:t>UniProt_reference_proteome_manager</a:t>
             </a:r>
             <a:endParaRPr lang="en-US" sz="4000" b="1" dirty="0"/>
@@ -5123,66 +4915,53 @@
           <a:lstStyle/>
           <a:p>
             <a:r>
-              <a:rPr lang="en-US" dirty="0" smtClean="0"/>
+              <a:rPr lang="en-US" dirty="0"/>
               <a:t>A few files are needed: </a:t>
             </a:r>
             <a:r>
-              <a:rPr lang="en-US" dirty="0" err="1" smtClean="0"/>
+              <a:rPr lang="en-US" dirty="0" err="1"/>
               <a:t>UniProt_reference_proteome_manager.py</a:t>
             </a:r>
             <a:r>
-              <a:rPr lang="en-US" dirty="0" smtClean="0"/>
+              <a:rPr lang="en-US" dirty="0"/>
               <a:t>, </a:t>
             </a:r>
             <a:r>
-              <a:rPr lang="en-US" dirty="0" err="1" smtClean="0"/>
+              <a:rPr lang="en-US" dirty="0" err="1"/>
               <a:t>fasta_lib.py</a:t>
             </a:r>
             <a:r>
-              <a:rPr lang="en-US" dirty="0" smtClean="0"/>
+              <a:rPr lang="en-US" dirty="0"/>
               <a:t>, </a:t>
             </a:r>
             <a:r>
-              <a:rPr lang="en-US" dirty="0" err="1" smtClean="0"/>
+              <a:rPr lang="en-US" dirty="0" err="1"/>
               <a:t>reverse_fasta.py</a:t>
             </a:r>
             <a:r>
-              <a:rPr lang="en-US" dirty="0" smtClean="0"/>
-              <a:t>, and a contaminants FASTA file (configured to use </a:t>
-            </a:r>
-            <a:r>
-              <a:rPr lang="en-US" dirty="0" smtClean="0"/>
-              <a:t>“</a:t>
-            </a:r>
-            <a:r>
-              <a:rPr lang="en-US" dirty="0" err="1" smtClean="0"/>
-              <a:t>Thermo</a:t>
-            </a:r>
-            <a:r>
-              <a:rPr lang="en-US" dirty="0" err="1" smtClean="0"/>
-              <a:t>_contams_fixed.fasta</a:t>
-            </a:r>
-            <a:r>
-              <a:rPr lang="en-US" dirty="0" smtClean="0"/>
+              <a:rPr lang="en-US" dirty="0"/>
+              <a:t>, and a contaminants FASTA file (configured to use “</a:t>
+            </a:r>
+            <a:r>
+              <a:rPr lang="en-US" dirty="0" err="1"/>
+              <a:t>Thermo_contams_fixed.fasta</a:t>
+            </a:r>
+            <a:r>
+              <a:rPr lang="en-US" dirty="0"/>
               <a:t>”)</a:t>
             </a:r>
           </a:p>
           <a:p>
             <a:r>
-              <a:rPr lang="en-US" dirty="0" smtClean="0"/>
+              <a:rPr lang="en-US" dirty="0"/>
               <a:t>The files should be in the same folder and that folder can be located anywhere</a:t>
             </a:r>
           </a:p>
           <a:p>
             <a:r>
-              <a:rPr lang="en-US" dirty="0" smtClean="0"/>
-              <a:t>Python version 3 is required</a:t>
-            </a:r>
-            <a:r>
-              <a:rPr lang="en-US" dirty="0"/>
-              <a:t> (3.6 is current release) </a:t>
-            </a:r>
-            <a:endParaRPr lang="en-US" dirty="0" smtClean="0"/>
+              <a:rPr lang="en-US" dirty="0"/>
+              <a:t>Python version 3 is required (3.6 is current release) </a:t>
+            </a:r>
           </a:p>
           <a:p>
             <a:pPr lvl="1"/>
@@ -5190,15 +4969,9 @@
               <a:rPr lang="en-US" dirty="0">
                 <a:hlinkClick r:id="rId2"/>
               </a:rPr>
-              <a:t>https://www.python.org/downloads</a:t>
-            </a:r>
-            <a:r>
-              <a:rPr lang="en-US" dirty="0" smtClean="0">
-                <a:hlinkClick r:id="rId2"/>
-              </a:rPr>
-              <a:t>/</a:t>
-            </a:r>
-            <a:endParaRPr lang="en-US" dirty="0" smtClean="0"/>
+              <a:t>https://www.python.org/downloads/</a:t>
+            </a:r>
+            <a:endParaRPr lang="en-US" dirty="0"/>
           </a:p>
           <a:p>
             <a:pPr lvl="1"/>
@@ -5214,21 +4987,19 @@
               <a:rPr lang="en-US" dirty="0"/>
               <a:t>/downloads</a:t>
             </a:r>
-            <a:endParaRPr lang="en-US" dirty="0" smtClean="0"/>
-          </a:p>
-          <a:p>
-            <a:r>
-              <a:rPr lang="en-US" dirty="0" smtClean="0"/>
+          </a:p>
+          <a:p>
+            <a:r>
+              <a:rPr lang="en-US" dirty="0"/>
               <a:t>Application can be ran from command line or integrated programming environment editor windows</a:t>
             </a:r>
           </a:p>
           <a:p>
             <a:pPr lvl="1"/>
             <a:r>
-              <a:rPr lang="en-US" dirty="0" smtClean="0"/>
+              <a:rPr lang="en-US" dirty="0"/>
               <a:t>There are many online resources for how to run python scripts</a:t>
             </a:r>
-            <a:endParaRPr lang="en-US" dirty="0"/>
           </a:p>
         </p:txBody>
       </p:sp>
@@ -5267,7 +5038,7 @@
           <p:cNvPr id="2" name="Title 1">
             <a:extLst>
               <a:ext uri="{FF2B5EF4-FFF2-40B4-BE49-F238E27FC236}">
-                <a16:creationId xmlns:a16="http://schemas.microsoft.com/office/drawing/2014/main" xmlns="" id="{0CB0C90F-4481-4C0C-8303-AF5538EDB207}"/>
+                <a16:creationId xmlns:a16="http://schemas.microsoft.com/office/drawing/2014/main" id="{0CB0C90F-4481-4C0C-8303-AF5538EDB207}"/>
               </a:ext>
             </a:extLst>
           </p:cNvPr>
@@ -5301,7 +5072,7 @@
           <p:cNvPr id="7" name="TextBox 6">
             <a:extLst>
               <a:ext uri="{FF2B5EF4-FFF2-40B4-BE49-F238E27FC236}">
-                <a16:creationId xmlns:a16="http://schemas.microsoft.com/office/drawing/2014/main" xmlns="" id="{AFAA1ECF-262C-492F-B424-70461622F911}"/>
+                <a16:creationId xmlns:a16="http://schemas.microsoft.com/office/drawing/2014/main" id="{AFAA1ECF-262C-492F-B424-70461622F911}"/>
               </a:ext>
             </a:extLst>
           </p:cNvPr>
@@ -5397,7 +5168,7 @@
           <p:cNvPr id="8" name="TextBox 7">
             <a:extLst>
               <a:ext uri="{FF2B5EF4-FFF2-40B4-BE49-F238E27FC236}">
-                <a16:creationId xmlns:a16="http://schemas.microsoft.com/office/drawing/2014/main" xmlns="" id="{17EA87E6-509E-43E1-AD10-F2E2F4E837A4}"/>
+                <a16:creationId xmlns:a16="http://schemas.microsoft.com/office/drawing/2014/main" id="{17EA87E6-509E-43E1-AD10-F2E2F4E837A4}"/>
               </a:ext>
             </a:extLst>
           </p:cNvPr>
@@ -5422,15 +5193,7 @@
           <a:p>
             <a:r>
               <a:rPr lang="en-US" dirty="0"/>
-              <a:t>F. </a:t>
-            </a:r>
-            <a:r>
-              <a:rPr lang="en-US" dirty="0" smtClean="0"/>
-              <a:t> This </a:t>
-            </a:r>
-            <a:r>
-              <a:rPr lang="en-US" dirty="0"/>
-              <a:t>status bar will display any changes made to either display box including adding/dropping proteomes, </a:t>
+              <a:t>F.  This status bar will display any changes made to either display box including adding/dropping proteomes, </a:t>
             </a:r>
             <a:r>
               <a:rPr lang="en-US" dirty="0" err="1"/>
@@ -5448,7 +5211,7 @@
           <p:cNvPr id="9" name="Content Placeholder 8">
             <a:extLst>
               <a:ext uri="{FF2B5EF4-FFF2-40B4-BE49-F238E27FC236}">
-                <a16:creationId xmlns:a16="http://schemas.microsoft.com/office/drawing/2014/main" xmlns="" id="{BA22EBB6-905F-4527-B64A-14B5FEA3C526}"/>
+                <a16:creationId xmlns:a16="http://schemas.microsoft.com/office/drawing/2014/main" id="{BA22EBB6-905F-4527-B64A-14B5FEA3C526}"/>
               </a:ext>
             </a:extLst>
           </p:cNvPr>
@@ -5513,7 +5276,7 @@
           <p:cNvPr id="2" name="Title 1">
             <a:extLst>
               <a:ext uri="{FF2B5EF4-FFF2-40B4-BE49-F238E27FC236}">
-                <a16:creationId xmlns:a16="http://schemas.microsoft.com/office/drawing/2014/main" xmlns="" id="{F532A41A-294E-456E-AF8A-EF505C3ED328}"/>
+                <a16:creationId xmlns:a16="http://schemas.microsoft.com/office/drawing/2014/main" id="{F532A41A-294E-456E-AF8A-EF505C3ED328}"/>
               </a:ext>
             </a:extLst>
           </p:cNvPr>
@@ -5531,10 +5294,9 @@
           <a:p>
             <a:pPr algn="ctr"/>
             <a:r>
-              <a:rPr lang="en-US" b="1" dirty="0" smtClean="0"/>
+              <a:rPr lang="en-US" b="1" dirty="0"/>
               <a:t>Filter Descriptions</a:t>
             </a:r>
-            <a:endParaRPr lang="en-US" b="1" dirty="0"/>
           </a:p>
         </p:txBody>
       </p:sp>
@@ -5543,7 +5305,7 @@
           <p:cNvPr id="6" name="TextBox 5">
             <a:extLst>
               <a:ext uri="{FF2B5EF4-FFF2-40B4-BE49-F238E27FC236}">
-                <a16:creationId xmlns:a16="http://schemas.microsoft.com/office/drawing/2014/main" xmlns="" id="{96719524-CA70-45DC-A8CA-6B093B27E318}"/>
+                <a16:creationId xmlns:a16="http://schemas.microsoft.com/office/drawing/2014/main" id="{96719524-CA70-45DC-A8CA-6B093B27E318}"/>
               </a:ext>
             </a:extLst>
           </p:cNvPr>
@@ -5580,15 +5342,7 @@
             </a:pPr>
             <a:r>
               <a:rPr lang="en-US" dirty="0"/>
-              <a:t>The “Additional Database </a:t>
-            </a:r>
-            <a:r>
-              <a:rPr lang="en-US" dirty="0" smtClean="0"/>
-              <a:t>Processing” </a:t>
-            </a:r>
-            <a:r>
-              <a:rPr lang="en-US" dirty="0"/>
-              <a:t>checkboxes allow the user to decide whether or not downloaded </a:t>
+              <a:t>The “Additional Database Processing” checkboxes allow the user to decide whether or not downloaded </a:t>
             </a:r>
             <a:r>
               <a:rPr lang="en-US" dirty="0" err="1"/>
@@ -5596,15 +5350,7 @@
             </a:r>
             <a:r>
               <a:rPr lang="en-US" dirty="0"/>
-              <a:t> files should include </a:t>
-            </a:r>
-            <a:r>
-              <a:rPr lang="en-US" dirty="0" smtClean="0"/>
-              <a:t>reversed </a:t>
-            </a:r>
-            <a:r>
-              <a:rPr lang="en-US" dirty="0"/>
-              <a:t>sequences and/or common contaminants.</a:t>
+              <a:t> files should include reversed sequences and/or common contaminants.</a:t>
             </a:r>
           </a:p>
           <a:p>
@@ -5644,65 +5390,24 @@
           <a:p>
             <a:r>
               <a:rPr lang="en-US" dirty="0"/>
-              <a:t>Note: It is </a:t>
-            </a:r>
-            <a:r>
-              <a:rPr lang="en-US" dirty="0" smtClean="0"/>
-              <a:t>valid </a:t>
-            </a:r>
-            <a:r>
-              <a:rPr lang="en-US" dirty="0"/>
-              <a:t>to have empty search bars including kingdoms. Also, if </a:t>
-            </a:r>
-            <a:r>
-              <a:rPr lang="en-US" dirty="0" smtClean="0"/>
-              <a:t>“Target/Decoy Databases” </a:t>
-            </a:r>
-            <a:r>
-              <a:rPr lang="en-US" dirty="0"/>
-              <a:t>is selected, </a:t>
-            </a:r>
-            <a:r>
-              <a:rPr lang="en-US" dirty="0" smtClean="0"/>
-              <a:t>“*_both” </a:t>
-            </a:r>
-            <a:r>
-              <a:rPr lang="en-US" dirty="0"/>
-              <a:t>will be appended to the </a:t>
-            </a:r>
-            <a:r>
-              <a:rPr lang="en-US" dirty="0" err="1" smtClean="0"/>
+              <a:t>Note: It is valid to have empty search bars including kingdoms. Also, if “Target/Decoy Databases” is selected, “*_both” will be appended to the </a:t>
+            </a:r>
+            <a:r>
+              <a:rPr lang="en-US" dirty="0" err="1"/>
               <a:t>fasta</a:t>
             </a:r>
             <a:r>
-              <a:rPr lang="en-US" dirty="0" smtClean="0"/>
+              <a:rPr lang="en-US" dirty="0"/>
               <a:t> file name (with or without </a:t>
             </a:r>
             <a:r>
-              <a:rPr lang="en-US" dirty="0" err="1" smtClean="0"/>
+              <a:rPr lang="en-US" dirty="0" err="1"/>
               <a:t>contams</a:t>
             </a:r>
             <a:r>
-              <a:rPr lang="en-US" dirty="0" smtClean="0"/>
-              <a:t>). </a:t>
-            </a:r>
-            <a:r>
-              <a:rPr lang="en-US" dirty="0"/>
-              <a:t>If </a:t>
-            </a:r>
-            <a:r>
-              <a:rPr lang="en-US" dirty="0" smtClean="0"/>
-              <a:t>only “Add Contaminants</a:t>
-            </a:r>
-            <a:r>
-              <a:rPr lang="en-US" dirty="0"/>
-              <a:t>” is selected, “*_for” will be appended</a:t>
-            </a:r>
-            <a:r>
-              <a:rPr lang="en-US" dirty="0" smtClean="0"/>
-              <a:t>.</a:t>
-            </a:r>
-            <a:endParaRPr lang="en-US" dirty="0"/>
+              <a:rPr lang="en-US" dirty="0"/>
+              <a:t>). If only “Add Contaminants” is selected, “*_for” will be appended.</a:t>
+            </a:r>
           </a:p>
           <a:p>
             <a:pPr marL="342900" indent="-342900">
@@ -5717,7 +5422,7 @@
           <p:cNvPr id="8" name="Content Placeholder 7">
             <a:extLst>
               <a:ext uri="{FF2B5EF4-FFF2-40B4-BE49-F238E27FC236}">
-                <a16:creationId xmlns:a16="http://schemas.microsoft.com/office/drawing/2014/main" xmlns="" id="{308B288B-3489-4FD6-8FC1-87CD3D75423C}"/>
+                <a16:creationId xmlns:a16="http://schemas.microsoft.com/office/drawing/2014/main" id="{308B288B-3489-4FD6-8FC1-87CD3D75423C}"/>
               </a:ext>
             </a:extLst>
           </p:cNvPr>
@@ -5782,7 +5487,7 @@
           <p:cNvPr id="2" name="Title 1">
             <a:extLst>
               <a:ext uri="{FF2B5EF4-FFF2-40B4-BE49-F238E27FC236}">
-                <a16:creationId xmlns:a16="http://schemas.microsoft.com/office/drawing/2014/main" xmlns="" id="{1F0C4AC0-B4FC-4F18-9E24-4341BBF191C1}"/>
+                <a16:creationId xmlns:a16="http://schemas.microsoft.com/office/drawing/2014/main" id="{1F0C4AC0-B4FC-4F18-9E24-4341BBF191C1}"/>
               </a:ext>
             </a:extLst>
           </p:cNvPr>
@@ -5816,7 +5521,7 @@
           <p:cNvPr id="6" name="TextBox 5">
             <a:extLst>
               <a:ext uri="{FF2B5EF4-FFF2-40B4-BE49-F238E27FC236}">
-                <a16:creationId xmlns:a16="http://schemas.microsoft.com/office/drawing/2014/main" xmlns="" id="{F4D27808-9904-45BC-8BC8-C0D19D9AD3D4}"/>
+                <a16:creationId xmlns:a16="http://schemas.microsoft.com/office/drawing/2014/main" id="{F4D27808-9904-45BC-8BC8-C0D19D9AD3D4}"/>
               </a:ext>
             </a:extLst>
           </p:cNvPr>
@@ -5840,72 +5545,24 @@
           <a:lstStyle/>
           <a:p>
             <a:r>
-              <a:rPr lang="en-US" dirty="0" smtClean="0"/>
-              <a:t>Here, all </a:t>
-            </a:r>
-            <a:r>
-              <a:rPr lang="en-US" dirty="0"/>
-              <a:t>kingdoms </a:t>
-            </a:r>
-            <a:r>
-              <a:rPr lang="en-US" dirty="0" smtClean="0"/>
-              <a:t>are left selected </a:t>
-            </a:r>
-            <a:r>
-              <a:rPr lang="en-US" dirty="0"/>
-              <a:t>and searched </a:t>
-            </a:r>
-            <a:r>
-              <a:rPr lang="en-US" dirty="0" smtClean="0"/>
-              <a:t>for </a:t>
-            </a:r>
-            <a:r>
-              <a:rPr lang="en-US" smtClean="0"/>
+              <a:rPr lang="en-US" dirty="0"/>
+              <a:t>Here, all kingdoms are left selected and searched for </a:t>
+            </a:r>
+            <a:r>
+              <a:rPr lang="en-US"/>
               <a:t>and species names containing </a:t>
             </a:r>
             <a:r>
-              <a:rPr lang="en-US" dirty="0" smtClean="0"/>
-              <a:t>“human</a:t>
-            </a:r>
-            <a:r>
-              <a:rPr lang="en-US" dirty="0"/>
-              <a:t>” </a:t>
-            </a:r>
-            <a:r>
-              <a:rPr lang="en-US"/>
-              <a:t>and </a:t>
-            </a:r>
-            <a:r>
-              <a:rPr lang="en-US" smtClean="0"/>
-              <a:t>with “96</a:t>
-            </a:r>
-            <a:r>
-              <a:rPr lang="en-US" dirty="0"/>
-              <a:t>” as a partial taxon number. T</a:t>
-            </a:r>
-            <a:r>
-              <a:rPr lang="en-US" dirty="0" smtClean="0"/>
-              <a:t>he </a:t>
-            </a:r>
-            <a:r>
-              <a:rPr lang="en-US" dirty="0"/>
-              <a:t>“Homo sapiens” database </a:t>
-            </a:r>
-            <a:r>
-              <a:rPr lang="en-US" dirty="0" smtClean="0"/>
-              <a:t>has been selected for downloading, </a:t>
-            </a:r>
-            <a:r>
-              <a:rPr lang="en-US" dirty="0"/>
-              <a:t>and the </a:t>
-            </a:r>
-            <a:r>
-              <a:rPr lang="en-US" dirty="0" smtClean="0"/>
-              <a:t>resulting FASTA file </a:t>
-            </a:r>
-            <a:r>
-              <a:rPr lang="en-US" dirty="0"/>
-              <a:t>will include common contaminants.</a:t>
+              <a:rPr lang="en-US" dirty="0"/>
+              <a:t>“human” </a:t>
+            </a:r>
+            <a:r>
+              <a:rPr lang="en-US"/>
+              <a:t>and with “96</a:t>
+            </a:r>
+            <a:r>
+              <a:rPr lang="en-US" dirty="0"/>
+              <a:t>” as a partial taxon number. The “Homo sapiens” database has been selected for downloading, and the resulting FASTA file will include common contaminants.</a:t>
             </a:r>
           </a:p>
         </p:txBody>
@@ -5915,7 +5572,7 @@
           <p:cNvPr id="8" name="Content Placeholder 7">
             <a:extLst>
               <a:ext uri="{FF2B5EF4-FFF2-40B4-BE49-F238E27FC236}">
-                <a16:creationId xmlns:a16="http://schemas.microsoft.com/office/drawing/2014/main" xmlns="" id="{BB85C8BE-B143-409B-9E77-99AD3A900050}"/>
+                <a16:creationId xmlns:a16="http://schemas.microsoft.com/office/drawing/2014/main" id="{BB85C8BE-B143-409B-9E77-99AD3A900050}"/>
               </a:ext>
             </a:extLst>
           </p:cNvPr>

</xml_diff>